<commit_message>
Fixed small problems with PDR slides
</commit_message>
<xml_diff>
--- a/PDR/PDR.pptx
+++ b/PDR/PDR.pptx
@@ -4177,8 +4177,8 @@
         </p:nvSpPr>
         <p:spPr>
           <a:xfrm>
-            <a:off x="5486400" y="1981200"/>
-            <a:ext cx="3505200" cy="3124200"/>
+            <a:off x="4876800" y="1981200"/>
+            <a:ext cx="4114800" cy="3124200"/>
           </a:xfrm>
           <a:prstGeom prst="rect">
             <a:avLst/>
@@ -4186,7 +4186,7 @@
         </p:spPr>
         <p:txBody>
           <a:bodyPr vert="horz" anchor="ctr">
-            <a:normAutofit fontScale="92500" lnSpcReduction="20000"/>
+            <a:normAutofit lnSpcReduction="10000"/>
           </a:bodyPr>
           <a:lstStyle>
             <a:lvl1pPr marL="484632" algn="l" rtl="0" eaLnBrk="1" latinLnBrk="0" hangingPunct="1">
@@ -10478,7 +10478,7 @@
             <p:ph idx="1"/>
             <p:extLst>
               <p:ext uri="{D42A27DB-BD31-4B8C-83A1-F6EECF244321}">
-                <p14:modId xmlns:p14="http://schemas.microsoft.com/office/powerpoint/2010/main" val="2897383790"/>
+                <p14:modId xmlns:p14="http://schemas.microsoft.com/office/powerpoint/2010/main" val="1303729074"/>
               </p:ext>
             </p:extLst>
           </p:nvPr>
@@ -10752,7 +10752,7 @@
                     <a:p>
                       <a:r>
                         <a:rPr lang="en-US" dirty="0" smtClean="0"/>
-                        <a:t>Lighting/Camera</a:t>
+                        <a:t>Lighting</a:t>
                       </a:r>
                       <a:endParaRPr lang="en-US" dirty="0"/>
                     </a:p>

</xml_diff>

<commit_message>
More random updates to PDR
</commit_message>
<xml_diff>
--- a/PDR/PDR.pptx
+++ b/PDR/PDR.pptx
@@ -10478,14 +10478,14 @@
             <p:ph idx="1"/>
             <p:extLst>
               <p:ext uri="{D42A27DB-BD31-4B8C-83A1-F6EECF244321}">
-                <p14:modId xmlns:p14="http://schemas.microsoft.com/office/powerpoint/2010/main" val="1303729074"/>
+                <p14:modId xmlns:p14="http://schemas.microsoft.com/office/powerpoint/2010/main" val="1184119993"/>
               </p:ext>
             </p:extLst>
           </p:nvPr>
         </p:nvGraphicFramePr>
         <p:xfrm>
           <a:off x="228600" y="685800"/>
-          <a:ext cx="8763000" cy="5801360"/>
+          <a:ext cx="8763000" cy="5527040"/>
         </p:xfrm>
         <a:graphic>
           <a:graphicData uri="http://schemas.openxmlformats.org/drawingml/2006/table">
@@ -10657,7 +10657,7 @@
                     <a:p>
                       <a:r>
                         <a:rPr lang="en-US" dirty="0" smtClean="0"/>
-                        <a:t>Software Computer Interface</a:t>
+                        <a:t>Computer Applications</a:t>
                       </a:r>
                       <a:endParaRPr lang="en-US" dirty="0"/>
                     </a:p>
@@ -10846,8 +10846,8 @@
                     <a:lstStyle/>
                     <a:p>
                       <a:r>
-                        <a:rPr lang="en-US" dirty="0" smtClean="0"/>
-                        <a:t>Pupil Detection Algorithm</a:t>
+                        <a:rPr lang="en-US" smtClean="0"/>
+                        <a:t>DSP</a:t>
                       </a:r>
                       <a:endParaRPr lang="en-US" dirty="0"/>
                     </a:p>
@@ -11243,7 +11243,7 @@
                     <a:bodyPr/>
                     <a:lstStyle/>
                     <a:p>
-                      <a:endParaRPr lang="en-US"/>
+                      <a:endParaRPr lang="en-US" dirty="0"/>
                     </a:p>
                   </a:txBody>
                   <a:tcPr/>
@@ -11433,7 +11433,7 @@
                     <a:bodyPr/>
                     <a:lstStyle/>
                     <a:p>
-                      <a:endParaRPr lang="en-US"/>
+                      <a:endParaRPr lang="en-US" dirty="0"/>
                     </a:p>
                   </a:txBody>
                   <a:tcPr/>
@@ -11508,7 +11508,7 @@
                   <a:tcPr/>
                 </a:tc>
               </a:tr>
-              <a:tr h="370840">
+              <a:tr h="350520">
                 <a:tc>
                   <a:txBody>
                     <a:bodyPr/>

</xml_diff>

<commit_message>
Updated PDR slides by reordering so Mike has more slides. Also edited notes section of ppt slides with name of presenter.
</commit_message>
<xml_diff>
--- a/PDR/PDR.pptx
+++ b/PDR/PDR.pptx
@@ -5,7 +5,7 @@
     <p:sldMasterId id="2147483660" r:id="rId1"/>
   </p:sldMasterIdLst>
   <p:notesMasterIdLst>
-    <p:notesMasterId r:id="rId39"/>
+    <p:notesMasterId r:id="rId42"/>
   </p:notesMasterIdLst>
   <p:sldIdLst>
     <p:sldId id="257" r:id="rId2"/>
@@ -36,15 +36,18 @@
     <p:sldId id="262" r:id="rId27"/>
     <p:sldId id="263" r:id="rId28"/>
     <p:sldId id="264" r:id="rId29"/>
-    <p:sldId id="289" r:id="rId30"/>
-    <p:sldId id="290" r:id="rId31"/>
-    <p:sldId id="304" r:id="rId32"/>
-    <p:sldId id="334" r:id="rId33"/>
-    <p:sldId id="291" r:id="rId34"/>
-    <p:sldId id="292" r:id="rId35"/>
-    <p:sldId id="293" r:id="rId36"/>
-    <p:sldId id="306" r:id="rId37"/>
-    <p:sldId id="286" r:id="rId38"/>
+    <p:sldId id="337" r:id="rId30"/>
+    <p:sldId id="338" r:id="rId31"/>
+    <p:sldId id="339" r:id="rId32"/>
+    <p:sldId id="340" r:id="rId33"/>
+    <p:sldId id="335" r:id="rId34"/>
+    <p:sldId id="289" r:id="rId35"/>
+    <p:sldId id="290" r:id="rId36"/>
+    <p:sldId id="304" r:id="rId37"/>
+    <p:sldId id="306" r:id="rId38"/>
+    <p:sldId id="341" r:id="rId39"/>
+    <p:sldId id="286" r:id="rId40"/>
+    <p:sldId id="336" r:id="rId41"/>
   </p:sldIdLst>
   <p:sldSz cx="9144000" cy="6858000" type="screen4x3"/>
   <p:notesSz cx="6858000" cy="9144000"/>
@@ -400,7 +403,7 @@
     </p:spTree>
     <p:extLst>
       <p:ext uri="{BB962C8B-B14F-4D97-AF65-F5344CB8AC3E}">
-        <p14:creationId xmlns:p14="http://schemas.microsoft.com/office/powerpoint/2010/main" xmlns="" val="2862036667"/>
+        <p14:creationId xmlns:p14="http://schemas.microsoft.com/office/powerpoint/2010/main" val="2862036667"/>
       </p:ext>
     </p:extLst>
   </p:cSld>
@@ -541,14 +544,12 @@
         </p:nvSpPr>
         <p:spPr/>
         <p:txBody>
-          <a:bodyPr>
-            <a:normAutofit/>
-          </a:bodyPr>
+          <a:bodyPr/>
           <a:lstStyle/>
           <a:p>
             <a:r>
               <a:rPr lang="en-US" dirty="0" err="1" smtClean="0"/>
-              <a:t>Khashi</a:t>
+              <a:t>Armeen</a:t>
             </a:r>
             <a:endParaRPr lang="en-US" dirty="0"/>
           </a:p>
@@ -572,13 +573,18 @@
             <a:fld id="{9E3BEF81-0DBD-4698-923F-7BE580063ACF}" type="slidenum">
               <a:rPr lang="en-US" smtClean="0"/>
               <a:pPr/>
-              <a:t>2</a:t>
+              <a:t>1</a:t>
             </a:fld>
             <a:endParaRPr lang="en-US"/>
           </a:p>
         </p:txBody>
       </p:sp>
     </p:spTree>
+    <p:extLst>
+      <p:ext uri="{BB962C8B-B14F-4D97-AF65-F5344CB8AC3E}">
+        <p14:creationId xmlns:p14="http://schemas.microsoft.com/office/powerpoint/2010/main" val="2513944030"/>
+      </p:ext>
+    </p:extLst>
   </p:cSld>
   <p:clrMapOvr>
     <a:masterClrMapping/>
@@ -632,33 +638,10 @@
           </a:bodyPr>
           <a:lstStyle/>
           <a:p>
-            <a:pPr marL="0" marR="0" indent="0" algn="l" defTabSz="914400" rtl="0" eaLnBrk="1" fontAlgn="auto" latinLnBrk="0" hangingPunct="1">
-              <a:lnSpc>
-                <a:spcPct val="100000"/>
-              </a:lnSpc>
-              <a:spcBef>
-                <a:spcPts val="0"/>
-              </a:spcBef>
-              <a:spcAft>
-                <a:spcPts val="0"/>
-              </a:spcAft>
-              <a:buClrTx/>
-              <a:buSzTx/>
-              <a:buFontTx/>
-              <a:buNone/>
-              <a:tabLst/>
-              <a:defRPr/>
-            </a:pPr>
-            <a:r>
-              <a:rPr lang="en-US" dirty="0" err="1" smtClean="0"/>
-              <a:t>Armeen</a:t>
-            </a:r>
             <a:r>
               <a:rPr lang="en-US" dirty="0" smtClean="0"/>
-              <a:t> or Nick</a:t>
-            </a:r>
-          </a:p>
-          <a:p>
+              <a:t>Nick</a:t>
+            </a:r>
             <a:endParaRPr lang="en-US" dirty="0"/>
           </a:p>
         </p:txBody>
@@ -681,7 +664,7 @@
             <a:fld id="{9E3BEF81-0DBD-4698-923F-7BE580063ACF}" type="slidenum">
               <a:rPr lang="en-US" smtClean="0"/>
               <a:pPr/>
-              <a:t>11</a:t>
+              <a:t>10</a:t>
             </a:fld>
             <a:endParaRPr lang="en-US"/>
           </a:p>
@@ -759,13 +742,10 @@
               <a:defRPr/>
             </a:pPr>
             <a:r>
-              <a:rPr lang="en-US" dirty="0" err="1" smtClean="0"/>
-              <a:t>Armeen</a:t>
-            </a:r>
-            <a:r>
               <a:rPr lang="en-US" dirty="0" smtClean="0"/>
-              <a:t> or Nick</a:t>
-            </a:r>
+              <a:t>Nick</a:t>
+            </a:r>
+            <a:endParaRPr lang="en-US" dirty="0" smtClean="0"/>
           </a:p>
           <a:p>
             <a:endParaRPr lang="en-US" dirty="0"/>
@@ -790,7 +770,7 @@
             <a:fld id="{9E3BEF81-0DBD-4698-923F-7BE580063ACF}" type="slidenum">
               <a:rPr lang="en-US" smtClean="0"/>
               <a:pPr/>
-              <a:t>12</a:t>
+              <a:t>11</a:t>
             </a:fld>
             <a:endParaRPr lang="en-US"/>
           </a:p>
@@ -867,6 +847,10 @@
               <a:tabLst/>
               <a:defRPr/>
             </a:pPr>
+            <a:r>
+              <a:rPr lang="en-US" dirty="0" smtClean="0"/>
+              <a:t>Nick</a:t>
+            </a:r>
             <a:endParaRPr lang="en-US" dirty="0" smtClean="0"/>
           </a:p>
           <a:p>
@@ -892,7 +876,7 @@
             <a:fld id="{9E3BEF81-0DBD-4698-923F-7BE580063ACF}" type="slidenum">
               <a:rPr lang="en-US" smtClean="0"/>
               <a:pPr/>
-              <a:t>13</a:t>
+              <a:t>12</a:t>
             </a:fld>
             <a:endParaRPr lang="en-US"/>
           </a:p>
@@ -970,16 +954,10 @@
               <a:defRPr/>
             </a:pPr>
             <a:r>
-              <a:rPr lang="en-US" dirty="0" err="1" smtClean="0"/>
-              <a:t>Armeen</a:t>
-            </a:r>
-            <a:r>
               <a:rPr lang="en-US" dirty="0" smtClean="0"/>
-              <a:t> or Nick</a:t>
-            </a:r>
-          </a:p>
-          <a:p>
-            <a:endParaRPr lang="en-US" dirty="0"/>
+              <a:t>Nick</a:t>
+            </a:r>
+            <a:endParaRPr lang="en-US" dirty="0" smtClean="0"/>
           </a:p>
         </p:txBody>
       </p:sp>
@@ -1001,7 +979,7 @@
             <a:fld id="{9E3BEF81-0DBD-4698-923F-7BE580063ACF}" type="slidenum">
               <a:rPr lang="en-US" smtClean="0"/>
               <a:pPr/>
-              <a:t>14</a:t>
+              <a:t>13</a:t>
             </a:fld>
             <a:endParaRPr lang="en-US"/>
           </a:p>
@@ -1080,12 +1058,9 @@
             </a:pPr>
             <a:r>
               <a:rPr lang="en-US" dirty="0" err="1" smtClean="0"/>
-              <a:t>Armeen</a:t>
-            </a:r>
-            <a:r>
-              <a:rPr lang="en-US" dirty="0" smtClean="0"/>
-              <a:t> or Nick</a:t>
-            </a:r>
+              <a:t>Khashi</a:t>
+            </a:r>
+            <a:endParaRPr lang="en-US" dirty="0" smtClean="0"/>
           </a:p>
           <a:p>
             <a:endParaRPr lang="en-US" dirty="0"/>
@@ -1110,7 +1085,7 @@
             <a:fld id="{9E3BEF81-0DBD-4698-923F-7BE580063ACF}" type="slidenum">
               <a:rPr lang="en-US" smtClean="0"/>
               <a:pPr/>
-              <a:t>15</a:t>
+              <a:t>14</a:t>
             </a:fld>
             <a:endParaRPr lang="en-US"/>
           </a:p>
@@ -1189,12 +1164,9 @@
             </a:pPr>
             <a:r>
               <a:rPr lang="en-US" dirty="0" err="1" smtClean="0"/>
-              <a:t>Armeen</a:t>
-            </a:r>
-            <a:r>
-              <a:rPr lang="en-US" dirty="0" smtClean="0"/>
-              <a:t> or Nick</a:t>
-            </a:r>
+              <a:t>Khashi</a:t>
+            </a:r>
+            <a:endParaRPr lang="en-US" dirty="0" smtClean="0"/>
           </a:p>
           <a:p>
             <a:endParaRPr lang="en-US" dirty="0"/>
@@ -1219,7 +1191,7 @@
             <a:fld id="{9E3BEF81-0DBD-4698-923F-7BE580063ACF}" type="slidenum">
               <a:rPr lang="en-US" smtClean="0"/>
               <a:pPr/>
-              <a:t>16</a:t>
+              <a:t>15</a:t>
             </a:fld>
             <a:endParaRPr lang="en-US"/>
           </a:p>
@@ -1298,12 +1270,9 @@
             </a:pPr>
             <a:r>
               <a:rPr lang="en-US" dirty="0" err="1" smtClean="0"/>
-              <a:t>Armeen</a:t>
-            </a:r>
-            <a:r>
-              <a:rPr lang="en-US" dirty="0" smtClean="0"/>
-              <a:t> or Nick</a:t>
-            </a:r>
+              <a:t>Khashi</a:t>
+            </a:r>
+            <a:endParaRPr lang="en-US" dirty="0" smtClean="0"/>
           </a:p>
           <a:p>
             <a:endParaRPr lang="en-US" dirty="0"/>
@@ -1328,7 +1297,7 @@
             <a:fld id="{9E3BEF81-0DBD-4698-923F-7BE580063ACF}" type="slidenum">
               <a:rPr lang="en-US" smtClean="0"/>
               <a:pPr/>
-              <a:t>17</a:t>
+              <a:t>16</a:t>
             </a:fld>
             <a:endParaRPr lang="en-US"/>
           </a:p>
@@ -1388,10 +1357,30 @@
           </a:bodyPr>
           <a:lstStyle/>
           <a:p>
-            <a:r>
-              <a:rPr lang="en-US" dirty="0" smtClean="0"/>
-              <a:t>Mike</a:t>
-            </a:r>
+            <a:pPr marL="0" marR="0" indent="0" algn="l" defTabSz="914400" rtl="0" eaLnBrk="1" fontAlgn="auto" latinLnBrk="0" hangingPunct="1">
+              <a:lnSpc>
+                <a:spcPct val="100000"/>
+              </a:lnSpc>
+              <a:spcBef>
+                <a:spcPts val="0"/>
+              </a:spcBef>
+              <a:spcAft>
+                <a:spcPts val="0"/>
+              </a:spcAft>
+              <a:buClrTx/>
+              <a:buSzTx/>
+              <a:buFontTx/>
+              <a:buNone/>
+              <a:tabLst/>
+              <a:defRPr/>
+            </a:pPr>
+            <a:r>
+              <a:rPr lang="en-US" dirty="0" err="1" smtClean="0"/>
+              <a:t>Khashi</a:t>
+            </a:r>
+            <a:endParaRPr lang="en-US" dirty="0" smtClean="0"/>
+          </a:p>
+          <a:p>
             <a:endParaRPr lang="en-US" dirty="0"/>
           </a:p>
         </p:txBody>
@@ -1414,7 +1403,7 @@
             <a:fld id="{9E3BEF81-0DBD-4698-923F-7BE580063ACF}" type="slidenum">
               <a:rPr lang="en-US" smtClean="0"/>
               <a:pPr/>
-              <a:t>18</a:t>
+              <a:t>17</a:t>
             </a:fld>
             <a:endParaRPr lang="en-US"/>
           </a:p>
@@ -1500,7 +1489,7 @@
             <a:fld id="{9E3BEF81-0DBD-4698-923F-7BE580063ACF}" type="slidenum">
               <a:rPr lang="en-US" smtClean="0"/>
               <a:pPr/>
-              <a:t>19</a:t>
+              <a:t>18</a:t>
             </a:fld>
             <a:endParaRPr lang="en-US"/>
           </a:p>
@@ -1586,7 +1575,7 @@
             <a:fld id="{9E3BEF81-0DBD-4698-923F-7BE580063ACF}" type="slidenum">
               <a:rPr lang="en-US" smtClean="0"/>
               <a:pPr/>
-              <a:t>20</a:t>
+              <a:t>19</a:t>
             </a:fld>
             <a:endParaRPr lang="en-US"/>
           </a:p>
@@ -1648,7 +1637,7 @@
           <a:p>
             <a:r>
               <a:rPr lang="en-US" dirty="0" err="1" smtClean="0"/>
-              <a:t>Khashi</a:t>
+              <a:t>Armeen</a:t>
             </a:r>
             <a:endParaRPr lang="en-US" dirty="0"/>
           </a:p>
@@ -1672,7 +1661,7 @@
             <a:fld id="{9E3BEF81-0DBD-4698-923F-7BE580063ACF}" type="slidenum">
               <a:rPr lang="en-US" smtClean="0"/>
               <a:pPr/>
-              <a:t>3</a:t>
+              <a:t>2</a:t>
             </a:fld>
             <a:endParaRPr lang="en-US"/>
           </a:p>
@@ -1758,7 +1747,7 @@
             <a:fld id="{9E3BEF81-0DBD-4698-923F-7BE580063ACF}" type="slidenum">
               <a:rPr lang="en-US" smtClean="0"/>
               <a:pPr/>
-              <a:t>21</a:t>
+              <a:t>20</a:t>
             </a:fld>
             <a:endParaRPr lang="en-US"/>
           </a:p>
@@ -1844,7 +1833,7 @@
             <a:fld id="{9E3BEF81-0DBD-4698-923F-7BE580063ACF}" type="slidenum">
               <a:rPr lang="en-US" smtClean="0"/>
               <a:pPr/>
-              <a:t>22</a:t>
+              <a:t>21</a:t>
             </a:fld>
             <a:endParaRPr lang="en-US"/>
           </a:p>
@@ -1930,7 +1919,7 @@
             <a:fld id="{9E3BEF81-0DBD-4698-923F-7BE580063ACF}" type="slidenum">
               <a:rPr lang="en-US" smtClean="0"/>
               <a:pPr/>
-              <a:t>23</a:t>
+              <a:t>22</a:t>
             </a:fld>
             <a:endParaRPr lang="en-US"/>
           </a:p>
@@ -1991,8 +1980,8 @@
           <a:lstStyle/>
           <a:p>
             <a:r>
-              <a:rPr lang="en-US" dirty="0" smtClean="0"/>
-              <a:t>Mike</a:t>
+              <a:rPr lang="en-US" dirty="0" err="1" smtClean="0"/>
+              <a:t>Khashi</a:t>
             </a:r>
             <a:endParaRPr lang="en-US" dirty="0"/>
           </a:p>
@@ -2016,7 +2005,7 @@
             <a:fld id="{9E3BEF81-0DBD-4698-923F-7BE580063ACF}" type="slidenum">
               <a:rPr lang="en-US" smtClean="0"/>
               <a:pPr/>
-              <a:t>24</a:t>
+              <a:t>23</a:t>
             </a:fld>
             <a:endParaRPr lang="en-US"/>
           </a:p>
@@ -2102,7 +2091,7 @@
             <a:fld id="{9E3BEF81-0DBD-4698-923F-7BE580063ACF}" type="slidenum">
               <a:rPr lang="en-US" smtClean="0"/>
               <a:pPr/>
-              <a:t>25</a:t>
+              <a:t>24</a:t>
             </a:fld>
             <a:endParaRPr lang="en-US"/>
           </a:p>
@@ -2188,7 +2177,7 @@
             <a:fld id="{9E3BEF81-0DBD-4698-923F-7BE580063ACF}" type="slidenum">
               <a:rPr lang="en-US" smtClean="0"/>
               <a:pPr/>
-              <a:t>26</a:t>
+              <a:t>25</a:t>
             </a:fld>
             <a:endParaRPr lang="en-US"/>
           </a:p>
@@ -2274,7 +2263,7 @@
             <a:fld id="{9E3BEF81-0DBD-4698-923F-7BE580063ACF}" type="slidenum">
               <a:rPr lang="en-US" smtClean="0"/>
               <a:pPr/>
-              <a:t>27</a:t>
+              <a:t>26</a:t>
             </a:fld>
             <a:endParaRPr lang="en-US"/>
           </a:p>
@@ -2360,7 +2349,7 @@
             <a:fld id="{9E3BEF81-0DBD-4698-923F-7BE580063ACF}" type="slidenum">
               <a:rPr lang="en-US" smtClean="0"/>
               <a:pPr/>
-              <a:t>28</a:t>
+              <a:t>27</a:t>
             </a:fld>
             <a:endParaRPr lang="en-US"/>
           </a:p>
@@ -2422,7 +2411,7 @@
           <a:p>
             <a:r>
               <a:rPr lang="en-US" dirty="0" smtClean="0"/>
-              <a:t>Arielle</a:t>
+              <a:t>Mike</a:t>
             </a:r>
             <a:endParaRPr lang="en-US" dirty="0"/>
           </a:p>
@@ -2446,7 +2435,7 @@
             <a:fld id="{9E3BEF81-0DBD-4698-923F-7BE580063ACF}" type="slidenum">
               <a:rPr lang="en-US" smtClean="0"/>
               <a:pPr/>
-              <a:t>29</a:t>
+              <a:t>28</a:t>
             </a:fld>
             <a:endParaRPr lang="en-US"/>
           </a:p>
@@ -2532,7 +2521,7 @@
             <a:fld id="{9E3BEF81-0DBD-4698-923F-7BE580063ACF}" type="slidenum">
               <a:rPr lang="en-US" smtClean="0"/>
               <a:pPr/>
-              <a:t>30</a:t>
+              <a:t>29</a:t>
             </a:fld>
             <a:endParaRPr lang="en-US"/>
           </a:p>
@@ -2592,58 +2581,10 @@
           </a:bodyPr>
           <a:lstStyle/>
           <a:p>
-            <a:pPr marL="0" marR="0" indent="0" algn="l" defTabSz="914400" rtl="0" eaLnBrk="1" fontAlgn="auto" latinLnBrk="0" hangingPunct="1">
-              <a:lnSpc>
-                <a:spcPct val="100000"/>
-              </a:lnSpc>
-              <a:spcBef>
-                <a:spcPts val="0"/>
-              </a:spcBef>
-              <a:spcAft>
-                <a:spcPts val="0"/>
-              </a:spcAft>
-              <a:buClrTx/>
-              <a:buSzTx/>
-              <a:buFontTx/>
-              <a:buNone/>
-              <a:tabLst/>
-              <a:defRPr/>
-            </a:pPr>
-            <a:r>
-              <a:rPr lang="en-US" dirty="0" smtClean="0"/>
-              <a:t>If the illumination</a:t>
-            </a:r>
-            <a:r>
-              <a:rPr lang="en-US" baseline="0" dirty="0" smtClean="0"/>
-              <a:t> is coaxial with the optical path, then the eye acts as a </a:t>
-            </a:r>
-            <a:r>
-              <a:rPr lang="en-US" baseline="0" dirty="0" err="1" smtClean="0"/>
-              <a:t>retroreflector</a:t>
-            </a:r>
-            <a:r>
-              <a:rPr lang="en-US" baseline="0" dirty="0" smtClean="0"/>
-              <a:t> as the light reflects of the retina creating a bright pupil effect. If the illumination source is offset from the optical path, </a:t>
-            </a:r>
-            <a:r>
-              <a:rPr lang="en-US" baseline="0" dirty="0" smtClean="0"/>
-              <a:t>then </a:t>
-            </a:r>
-            <a:r>
-              <a:rPr lang="en-US" baseline="0" dirty="0" smtClean="0"/>
-              <a:t>the pupil appears dark because the </a:t>
-            </a:r>
-            <a:r>
-              <a:rPr lang="en-US" baseline="0" dirty="0" err="1" smtClean="0"/>
-              <a:t>retroreflection</a:t>
-            </a:r>
-            <a:r>
-              <a:rPr lang="en-US" baseline="0" dirty="0" smtClean="0"/>
-              <a:t> from the retina is directed away from the camera.</a:t>
-            </a:r>
-            <a:endParaRPr lang="en-US" dirty="0" smtClean="0"/>
-          </a:p>
-          <a:p>
+            <a:r>
+              <a:rPr lang="en-US" dirty="0" err="1" smtClean="0"/>
+              <a:t>Armeen</a:t>
+            </a:r>
             <a:endParaRPr lang="en-US" dirty="0"/>
           </a:p>
         </p:txBody>
@@ -2666,7 +2607,7 @@
             <a:fld id="{9E3BEF81-0DBD-4698-923F-7BE580063ACF}" type="slidenum">
               <a:rPr lang="en-US" smtClean="0"/>
               <a:pPr/>
-              <a:t>4</a:t>
+              <a:t>3</a:t>
             </a:fld>
             <a:endParaRPr lang="en-US"/>
           </a:p>
@@ -2752,7 +2693,7 @@
             <a:fld id="{9E3BEF81-0DBD-4698-923F-7BE580063ACF}" type="slidenum">
               <a:rPr lang="en-US" smtClean="0"/>
               <a:pPr/>
-              <a:t>31</a:t>
+              <a:t>30</a:t>
             </a:fld>
             <a:endParaRPr lang="en-US"/>
           </a:p>
@@ -2814,7 +2755,7 @@
           <a:p>
             <a:r>
               <a:rPr lang="en-US" dirty="0" smtClean="0"/>
-              <a:t>Mike</a:t>
+              <a:t>Arielle</a:t>
             </a:r>
             <a:endParaRPr lang="en-US" dirty="0"/>
           </a:p>
@@ -2838,7 +2779,7 @@
             <a:fld id="{9E3BEF81-0DBD-4698-923F-7BE580063ACF}" type="slidenum">
               <a:rPr lang="en-US" smtClean="0"/>
               <a:pPr/>
-              <a:t>32</a:t>
+              <a:t>31</a:t>
             </a:fld>
             <a:endParaRPr lang="en-US"/>
           </a:p>
@@ -2924,7 +2865,7 @@
             <a:fld id="{9E3BEF81-0DBD-4698-923F-7BE580063ACF}" type="slidenum">
               <a:rPr lang="en-US" smtClean="0"/>
               <a:pPr/>
-              <a:t>33</a:t>
+              <a:t>32</a:t>
             </a:fld>
             <a:endParaRPr lang="en-US"/>
           </a:p>
@@ -3010,7 +2951,7 @@
             <a:fld id="{9E3BEF81-0DBD-4698-923F-7BE580063ACF}" type="slidenum">
               <a:rPr lang="en-US" smtClean="0"/>
               <a:pPr/>
-              <a:t>34</a:t>
+              <a:t>33</a:t>
             </a:fld>
             <a:endParaRPr lang="en-US"/>
           </a:p>
@@ -3096,7 +3037,7 @@
             <a:fld id="{9E3BEF81-0DBD-4698-923F-7BE580063ACF}" type="slidenum">
               <a:rPr lang="en-US" smtClean="0"/>
               <a:pPr/>
-              <a:t>35</a:t>
+              <a:t>34</a:t>
             </a:fld>
             <a:endParaRPr lang="en-US"/>
           </a:p>
@@ -3156,33 +3097,10 @@
           </a:bodyPr>
           <a:lstStyle/>
           <a:p>
-            <a:pPr marL="0" marR="0" indent="0" algn="l" defTabSz="914400" rtl="0" eaLnBrk="1" fontAlgn="auto" latinLnBrk="0" hangingPunct="1">
-              <a:lnSpc>
-                <a:spcPct val="100000"/>
-              </a:lnSpc>
-              <a:spcBef>
-                <a:spcPts val="0"/>
-              </a:spcBef>
-              <a:spcAft>
-                <a:spcPts val="0"/>
-              </a:spcAft>
-              <a:buClrTx/>
-              <a:buSzTx/>
-              <a:buFontTx/>
-              <a:buNone/>
-              <a:tabLst/>
-              <a:defRPr/>
-            </a:pPr>
-            <a:r>
-              <a:rPr lang="en-US" dirty="0" err="1" smtClean="0"/>
-              <a:t>Armeen</a:t>
-            </a:r>
             <a:r>
               <a:rPr lang="en-US" dirty="0" smtClean="0"/>
-              <a:t> or Nick</a:t>
-            </a:r>
-          </a:p>
-          <a:p>
+              <a:t>Arielle</a:t>
+            </a:r>
             <a:endParaRPr lang="en-US" dirty="0"/>
           </a:p>
         </p:txBody>
@@ -3205,7 +3123,7 @@
             <a:fld id="{9E3BEF81-0DBD-4698-923F-7BE580063ACF}" type="slidenum">
               <a:rPr lang="en-US" smtClean="0"/>
               <a:pPr/>
-              <a:t>36</a:t>
+              <a:t>35</a:t>
             </a:fld>
             <a:endParaRPr lang="en-US"/>
           </a:p>
@@ -3265,6 +3183,92 @@
           </a:bodyPr>
           <a:lstStyle/>
           <a:p>
+            <a:r>
+              <a:rPr lang="en-US" dirty="0" smtClean="0"/>
+              <a:t>Arielle</a:t>
+            </a:r>
+            <a:endParaRPr lang="en-US" dirty="0"/>
+          </a:p>
+        </p:txBody>
+      </p:sp>
+      <p:sp>
+        <p:nvSpPr>
+          <p:cNvPr id="4" name="Slide Number Placeholder 3"/>
+          <p:cNvSpPr>
+            <a:spLocks noGrp="1"/>
+          </p:cNvSpPr>
+          <p:nvPr>
+            <p:ph type="sldNum" sz="quarter" idx="10"/>
+          </p:nvPr>
+        </p:nvSpPr>
+        <p:spPr/>
+        <p:txBody>
+          <a:bodyPr/>
+          <a:lstStyle/>
+          <a:p>
+            <a:fld id="{9E3BEF81-0DBD-4698-923F-7BE580063ACF}" type="slidenum">
+              <a:rPr lang="en-US" smtClean="0"/>
+              <a:pPr/>
+              <a:t>36</a:t>
+            </a:fld>
+            <a:endParaRPr lang="en-US"/>
+          </a:p>
+        </p:txBody>
+      </p:sp>
+    </p:spTree>
+  </p:cSld>
+  <p:clrMapOvr>
+    <a:masterClrMapping/>
+  </p:clrMapOvr>
+</p:notes>
+</file>
+
+<file path=ppt/notesSlides/notesSlide37.xml><?xml version="1.0" encoding="utf-8"?>
+<p:notes xmlns:a="http://schemas.openxmlformats.org/drawingml/2006/main" xmlns:r="http://schemas.openxmlformats.org/officeDocument/2006/relationships" xmlns:p="http://schemas.openxmlformats.org/presentationml/2006/main">
+  <p:cSld>
+    <p:spTree>
+      <p:nvGrpSpPr>
+        <p:cNvPr id="1" name=""/>
+        <p:cNvGrpSpPr/>
+        <p:nvPr/>
+      </p:nvGrpSpPr>
+      <p:grpSpPr>
+        <a:xfrm>
+          <a:off x="0" y="0"/>
+          <a:ext cx="0" cy="0"/>
+          <a:chOff x="0" y="0"/>
+          <a:chExt cx="0" cy="0"/>
+        </a:xfrm>
+      </p:grpSpPr>
+      <p:sp>
+        <p:nvSpPr>
+          <p:cNvPr id="2" name="Slide Image Placeholder 1"/>
+          <p:cNvSpPr>
+            <a:spLocks noGrp="1" noRot="1" noChangeAspect="1"/>
+          </p:cNvSpPr>
+          <p:nvPr>
+            <p:ph type="sldImg"/>
+          </p:nvPr>
+        </p:nvSpPr>
+        <p:spPr/>
+      </p:sp>
+      <p:sp>
+        <p:nvSpPr>
+          <p:cNvPr id="3" name="Notes Placeholder 2"/>
+          <p:cNvSpPr>
+            <a:spLocks noGrp="1"/>
+          </p:cNvSpPr>
+          <p:nvPr>
+            <p:ph type="body" idx="1"/>
+          </p:nvPr>
+        </p:nvSpPr>
+        <p:spPr/>
+        <p:txBody>
+          <a:bodyPr>
+            <a:normAutofit/>
+          </a:bodyPr>
+          <a:lstStyle/>
+          <a:p>
             <a:pPr marL="0" marR="0" indent="0" algn="l" defTabSz="914400" rtl="0" eaLnBrk="1" fontAlgn="auto" latinLnBrk="0" hangingPunct="1">
               <a:lnSpc>
                 <a:spcPct val="100000"/>
@@ -3283,13 +3287,10 @@
               <a:defRPr/>
             </a:pPr>
             <a:r>
-              <a:rPr lang="en-US" dirty="0" err="1" smtClean="0"/>
-              <a:t>Armeen</a:t>
-            </a:r>
-            <a:r>
               <a:rPr lang="en-US" dirty="0" smtClean="0"/>
-              <a:t> or Nick</a:t>
-            </a:r>
+              <a:t>Arielle</a:t>
+            </a:r>
+            <a:endParaRPr lang="en-US" dirty="0" smtClean="0"/>
           </a:p>
           <a:p>
             <a:endParaRPr lang="en-US" dirty="0"/>
@@ -3321,6 +3322,201 @@
         </p:txBody>
       </p:sp>
     </p:spTree>
+  </p:cSld>
+  <p:clrMapOvr>
+    <a:masterClrMapping/>
+  </p:clrMapOvr>
+</p:notes>
+</file>
+
+<file path=ppt/notesSlides/notesSlide38.xml><?xml version="1.0" encoding="utf-8"?>
+<p:notes xmlns:a="http://schemas.openxmlformats.org/drawingml/2006/main" xmlns:r="http://schemas.openxmlformats.org/officeDocument/2006/relationships" xmlns:p="http://schemas.openxmlformats.org/presentationml/2006/main">
+  <p:cSld>
+    <p:spTree>
+      <p:nvGrpSpPr>
+        <p:cNvPr id="1" name=""/>
+        <p:cNvGrpSpPr/>
+        <p:nvPr/>
+      </p:nvGrpSpPr>
+      <p:grpSpPr>
+        <a:xfrm>
+          <a:off x="0" y="0"/>
+          <a:ext cx="0" cy="0"/>
+          <a:chOff x="0" y="0"/>
+          <a:chExt cx="0" cy="0"/>
+        </a:xfrm>
+      </p:grpSpPr>
+      <p:sp>
+        <p:nvSpPr>
+          <p:cNvPr id="2" name="Slide Image Placeholder 1"/>
+          <p:cNvSpPr>
+            <a:spLocks noGrp="1" noRot="1" noChangeAspect="1"/>
+          </p:cNvSpPr>
+          <p:nvPr>
+            <p:ph type="sldImg"/>
+          </p:nvPr>
+        </p:nvSpPr>
+        <p:spPr/>
+      </p:sp>
+      <p:sp>
+        <p:nvSpPr>
+          <p:cNvPr id="3" name="Notes Placeholder 2"/>
+          <p:cNvSpPr>
+            <a:spLocks noGrp="1"/>
+          </p:cNvSpPr>
+          <p:nvPr>
+            <p:ph type="body" idx="1"/>
+          </p:nvPr>
+        </p:nvSpPr>
+        <p:spPr/>
+        <p:txBody>
+          <a:bodyPr>
+            <a:normAutofit/>
+          </a:bodyPr>
+          <a:lstStyle/>
+          <a:p>
+            <a:pPr marL="0" marR="0" indent="0" algn="l" defTabSz="914400" rtl="0" eaLnBrk="1" fontAlgn="auto" latinLnBrk="0" hangingPunct="1">
+              <a:lnSpc>
+                <a:spcPct val="100000"/>
+              </a:lnSpc>
+              <a:spcBef>
+                <a:spcPts val="0"/>
+              </a:spcBef>
+              <a:spcAft>
+                <a:spcPts val="0"/>
+              </a:spcAft>
+              <a:buClrTx/>
+              <a:buSzTx/>
+              <a:buFontTx/>
+              <a:buNone/>
+              <a:tabLst/>
+              <a:defRPr/>
+            </a:pPr>
+            <a:r>
+              <a:rPr lang="en-US" dirty="0" smtClean="0"/>
+              <a:t>Arielle</a:t>
+            </a:r>
+            <a:endParaRPr lang="en-US" dirty="0" smtClean="0"/>
+          </a:p>
+          <a:p>
+            <a:endParaRPr lang="en-US" dirty="0"/>
+          </a:p>
+        </p:txBody>
+      </p:sp>
+      <p:sp>
+        <p:nvSpPr>
+          <p:cNvPr id="4" name="Slide Number Placeholder 3"/>
+          <p:cNvSpPr>
+            <a:spLocks noGrp="1"/>
+          </p:cNvSpPr>
+          <p:nvPr>
+            <p:ph type="sldNum" sz="quarter" idx="10"/>
+          </p:nvPr>
+        </p:nvSpPr>
+        <p:spPr/>
+        <p:txBody>
+          <a:bodyPr/>
+          <a:lstStyle/>
+          <a:p>
+            <a:fld id="{9E3BEF81-0DBD-4698-923F-7BE580063ACF}" type="slidenum">
+              <a:rPr lang="en-US" smtClean="0"/>
+              <a:pPr/>
+              <a:t>39</a:t>
+            </a:fld>
+            <a:endParaRPr lang="en-US"/>
+          </a:p>
+        </p:txBody>
+      </p:sp>
+    </p:spTree>
+  </p:cSld>
+  <p:clrMapOvr>
+    <a:masterClrMapping/>
+  </p:clrMapOvr>
+</p:notes>
+</file>
+
+<file path=ppt/notesSlides/notesSlide39.xml><?xml version="1.0" encoding="utf-8"?>
+<p:notes xmlns:a="http://schemas.openxmlformats.org/drawingml/2006/main" xmlns:r="http://schemas.openxmlformats.org/officeDocument/2006/relationships" xmlns:p="http://schemas.openxmlformats.org/presentationml/2006/main">
+  <p:cSld>
+    <p:spTree>
+      <p:nvGrpSpPr>
+        <p:cNvPr id="1" name=""/>
+        <p:cNvGrpSpPr/>
+        <p:nvPr/>
+      </p:nvGrpSpPr>
+      <p:grpSpPr>
+        <a:xfrm>
+          <a:off x="0" y="0"/>
+          <a:ext cx="0" cy="0"/>
+          <a:chOff x="0" y="0"/>
+          <a:chExt cx="0" cy="0"/>
+        </a:xfrm>
+      </p:grpSpPr>
+      <p:sp>
+        <p:nvSpPr>
+          <p:cNvPr id="2" name="Slide Image Placeholder 1"/>
+          <p:cNvSpPr>
+            <a:spLocks noGrp="1" noRot="1" noChangeAspect="1"/>
+          </p:cNvSpPr>
+          <p:nvPr>
+            <p:ph type="sldImg"/>
+          </p:nvPr>
+        </p:nvSpPr>
+        <p:spPr/>
+      </p:sp>
+      <p:sp>
+        <p:nvSpPr>
+          <p:cNvPr id="3" name="Notes Placeholder 2"/>
+          <p:cNvSpPr>
+            <a:spLocks noGrp="1"/>
+          </p:cNvSpPr>
+          <p:nvPr>
+            <p:ph type="body" idx="1"/>
+          </p:nvPr>
+        </p:nvSpPr>
+        <p:spPr/>
+        <p:txBody>
+          <a:bodyPr/>
+          <a:lstStyle/>
+          <a:p>
+            <a:r>
+              <a:rPr lang="en-US" dirty="0" smtClean="0"/>
+              <a:t>Arielle</a:t>
+            </a:r>
+            <a:endParaRPr lang="en-US" dirty="0"/>
+          </a:p>
+        </p:txBody>
+      </p:sp>
+      <p:sp>
+        <p:nvSpPr>
+          <p:cNvPr id="4" name="Slide Number Placeholder 3"/>
+          <p:cNvSpPr>
+            <a:spLocks noGrp="1"/>
+          </p:cNvSpPr>
+          <p:nvPr>
+            <p:ph type="sldNum" sz="quarter" idx="10"/>
+          </p:nvPr>
+        </p:nvSpPr>
+        <p:spPr/>
+        <p:txBody>
+          <a:bodyPr/>
+          <a:lstStyle/>
+          <a:p>
+            <a:fld id="{9E3BEF81-0DBD-4698-923F-7BE580063ACF}" type="slidenum">
+              <a:rPr lang="en-US" smtClean="0"/>
+              <a:pPr/>
+              <a:t>40</a:t>
+            </a:fld>
+            <a:endParaRPr lang="en-US"/>
+          </a:p>
+        </p:txBody>
+      </p:sp>
+    </p:spTree>
+    <p:extLst>
+      <p:ext uri="{BB962C8B-B14F-4D97-AF65-F5344CB8AC3E}">
+        <p14:creationId xmlns:p14="http://schemas.microsoft.com/office/powerpoint/2010/main" val="3899394326"/>
+      </p:ext>
+    </p:extLst>
   </p:cSld>
   <p:clrMapOvr>
     <a:masterClrMapping/>
@@ -3374,10 +3570,97 @@
           </a:bodyPr>
           <a:lstStyle/>
           <a:p>
-            <a:r>
-              <a:rPr lang="en-US" dirty="0" err="1" smtClean="0"/>
-              <a:t>Khashi</a:t>
-            </a:r>
+            <a:pPr marL="0" marR="0" indent="0" algn="l" defTabSz="914400" rtl="0" eaLnBrk="1" fontAlgn="auto" latinLnBrk="0" hangingPunct="1">
+              <a:lnSpc>
+                <a:spcPct val="100000"/>
+              </a:lnSpc>
+              <a:spcBef>
+                <a:spcPts val="0"/>
+              </a:spcBef>
+              <a:spcAft>
+                <a:spcPts val="0"/>
+              </a:spcAft>
+              <a:buClrTx/>
+              <a:buSzTx/>
+              <a:buFontTx/>
+              <a:buNone/>
+              <a:tabLst/>
+              <a:defRPr/>
+            </a:pPr>
+            <a:r>
+              <a:rPr lang="en-US" dirty="0" smtClean="0"/>
+              <a:t>If the illumination</a:t>
+            </a:r>
+            <a:r>
+              <a:rPr lang="en-US" baseline="0" dirty="0" smtClean="0"/>
+              <a:t> is coaxial with the optical path, then the eye acts as a </a:t>
+            </a:r>
+            <a:r>
+              <a:rPr lang="en-US" baseline="0" dirty="0" err="1" smtClean="0"/>
+              <a:t>retroreflector</a:t>
+            </a:r>
+            <a:r>
+              <a:rPr lang="en-US" baseline="0" dirty="0" smtClean="0"/>
+              <a:t> as the light reflects of the retina creating a bright pupil effect. If the illumination source is offset from the optical path, then the pupil appears dark because the </a:t>
+            </a:r>
+            <a:r>
+              <a:rPr lang="en-US" baseline="0" dirty="0" err="1" smtClean="0"/>
+              <a:t>retroreflection</a:t>
+            </a:r>
+            <a:r>
+              <a:rPr lang="en-US" baseline="0" dirty="0" smtClean="0"/>
+              <a:t> from the retina is directed away from the camera</a:t>
+            </a:r>
+            <a:r>
+              <a:rPr lang="en-US" baseline="0" dirty="0" smtClean="0"/>
+              <a:t>.</a:t>
+            </a:r>
+          </a:p>
+          <a:p>
+            <a:pPr marL="0" marR="0" indent="0" algn="l" defTabSz="914400" rtl="0" eaLnBrk="1" fontAlgn="auto" latinLnBrk="0" hangingPunct="1">
+              <a:lnSpc>
+                <a:spcPct val="100000"/>
+              </a:lnSpc>
+              <a:spcBef>
+                <a:spcPts val="0"/>
+              </a:spcBef>
+              <a:spcAft>
+                <a:spcPts val="0"/>
+              </a:spcAft>
+              <a:buClrTx/>
+              <a:buSzTx/>
+              <a:buFontTx/>
+              <a:buNone/>
+              <a:tabLst/>
+              <a:defRPr/>
+            </a:pPr>
+            <a:endParaRPr lang="en-US" baseline="0" dirty="0" smtClean="0"/>
+          </a:p>
+          <a:p>
+            <a:pPr marL="0" marR="0" indent="0" algn="l" defTabSz="914400" rtl="0" eaLnBrk="1" fontAlgn="auto" latinLnBrk="0" hangingPunct="1">
+              <a:lnSpc>
+                <a:spcPct val="100000"/>
+              </a:lnSpc>
+              <a:spcBef>
+                <a:spcPts val="0"/>
+              </a:spcBef>
+              <a:spcAft>
+                <a:spcPts val="0"/>
+              </a:spcAft>
+              <a:buClrTx/>
+              <a:buSzTx/>
+              <a:buFontTx/>
+              <a:buNone/>
+              <a:tabLst/>
+              <a:defRPr/>
+            </a:pPr>
+            <a:r>
+              <a:rPr lang="en-US" baseline="0" dirty="0" err="1" smtClean="0"/>
+              <a:t>Armeen</a:t>
+            </a:r>
+            <a:endParaRPr lang="en-US" dirty="0" smtClean="0"/>
+          </a:p>
+          <a:p>
             <a:endParaRPr lang="en-US" dirty="0"/>
           </a:p>
         </p:txBody>
@@ -3400,7 +3683,7 @@
             <a:fld id="{9E3BEF81-0DBD-4698-923F-7BE580063ACF}" type="slidenum">
               <a:rPr lang="en-US" smtClean="0"/>
               <a:pPr/>
-              <a:t>5</a:t>
+              <a:t>4</a:t>
             </a:fld>
             <a:endParaRPr lang="en-US"/>
           </a:p>
@@ -3461,8 +3744,8 @@
           <a:lstStyle/>
           <a:p>
             <a:r>
-              <a:rPr lang="en-US" dirty="0" smtClean="0"/>
-              <a:t>Mike</a:t>
+              <a:rPr lang="en-US" dirty="0" err="1" smtClean="0"/>
+              <a:t>Armeen</a:t>
             </a:r>
             <a:endParaRPr lang="en-US" dirty="0"/>
           </a:p>
@@ -3486,7 +3769,7 @@
             <a:fld id="{9E3BEF81-0DBD-4698-923F-7BE580063ACF}" type="slidenum">
               <a:rPr lang="en-US" smtClean="0"/>
               <a:pPr/>
-              <a:t>6</a:t>
+              <a:t>5</a:t>
             </a:fld>
             <a:endParaRPr lang="en-US"/>
           </a:p>
@@ -3546,33 +3829,10 @@
           </a:bodyPr>
           <a:lstStyle/>
           <a:p>
-            <a:pPr marL="0" marR="0" indent="0" algn="l" defTabSz="914400" rtl="0" eaLnBrk="1" fontAlgn="auto" latinLnBrk="0" hangingPunct="1">
-              <a:lnSpc>
-                <a:spcPct val="100000"/>
-              </a:lnSpc>
-              <a:spcBef>
-                <a:spcPts val="0"/>
-              </a:spcBef>
-              <a:spcAft>
-                <a:spcPts val="0"/>
-              </a:spcAft>
-              <a:buClrTx/>
-              <a:buSzTx/>
-              <a:buFontTx/>
-              <a:buNone/>
-              <a:tabLst/>
-              <a:defRPr/>
-            </a:pPr>
-            <a:r>
-              <a:rPr lang="en-US" dirty="0" err="1" smtClean="0"/>
-              <a:t>Armeen</a:t>
-            </a:r>
             <a:r>
               <a:rPr lang="en-US" dirty="0" smtClean="0"/>
-              <a:t> or Nick</a:t>
-            </a:r>
-          </a:p>
-          <a:p>
+              <a:t>Nick</a:t>
+            </a:r>
             <a:endParaRPr lang="en-US" dirty="0"/>
           </a:p>
         </p:txBody>
@@ -3595,7 +3855,7 @@
             <a:fld id="{9E3BEF81-0DBD-4698-923F-7BE580063ACF}" type="slidenum">
               <a:rPr lang="en-US" smtClean="0"/>
               <a:pPr/>
-              <a:t>7</a:t>
+              <a:t>6</a:t>
             </a:fld>
             <a:endParaRPr lang="en-US"/>
           </a:p>
@@ -3650,7 +3910,9 @@
         </p:nvSpPr>
         <p:spPr/>
         <p:txBody>
-          <a:bodyPr/>
+          <a:bodyPr>
+            <a:normAutofit/>
+          </a:bodyPr>
           <a:lstStyle/>
           <a:p>
             <a:pPr marL="0" marR="0" indent="0" algn="l" defTabSz="914400" rtl="0" eaLnBrk="1" fontAlgn="auto" latinLnBrk="0" hangingPunct="1">
@@ -3671,13 +3933,10 @@
               <a:defRPr/>
             </a:pPr>
             <a:r>
-              <a:rPr lang="en-US" dirty="0" err="1" smtClean="0"/>
-              <a:t>Armeen</a:t>
-            </a:r>
-            <a:r>
               <a:rPr lang="en-US" dirty="0" smtClean="0"/>
-              <a:t> or Nick</a:t>
-            </a:r>
+              <a:t>Nick</a:t>
+            </a:r>
+            <a:endParaRPr lang="en-US" dirty="0" smtClean="0"/>
           </a:p>
           <a:p>
             <a:endParaRPr lang="en-US" dirty="0"/>
@@ -3699,21 +3958,16 @@
           <a:bodyPr/>
           <a:lstStyle/>
           <a:p>
-            <a:fld id="{F4C4680C-AB34-4D49-99CB-6EC32CE03E33}" type="slidenum">
+            <a:fld id="{9E3BEF81-0DBD-4698-923F-7BE580063ACF}" type="slidenum">
               <a:rPr lang="en-US" smtClean="0"/>
               <a:pPr/>
-              <a:t>8</a:t>
+              <a:t>7</a:t>
             </a:fld>
             <a:endParaRPr lang="en-US"/>
           </a:p>
         </p:txBody>
       </p:sp>
     </p:spTree>
-    <p:extLst>
-      <p:ext uri="{BB962C8B-B14F-4D97-AF65-F5344CB8AC3E}">
-        <p14:creationId xmlns:p14="http://schemas.microsoft.com/office/powerpoint/2010/main" xmlns="" val="1929375149"/>
-      </p:ext>
-    </p:extLst>
   </p:cSld>
   <p:clrMapOvr>
     <a:masterClrMapping/>
@@ -3762,9 +4016,7 @@
         </p:nvSpPr>
         <p:spPr/>
         <p:txBody>
-          <a:bodyPr>
-            <a:normAutofit/>
-          </a:bodyPr>
+          <a:bodyPr/>
           <a:lstStyle/>
           <a:p>
             <a:pPr marL="0" marR="0" indent="0" algn="l" defTabSz="914400" rtl="0" eaLnBrk="1" fontAlgn="auto" latinLnBrk="0" hangingPunct="1">
@@ -3785,13 +4037,10 @@
               <a:defRPr/>
             </a:pPr>
             <a:r>
-              <a:rPr lang="en-US" dirty="0" err="1" smtClean="0"/>
-              <a:t>Armeen</a:t>
-            </a:r>
-            <a:r>
               <a:rPr lang="en-US" dirty="0" smtClean="0"/>
-              <a:t> or Nick</a:t>
-            </a:r>
+              <a:t>Nick</a:t>
+            </a:r>
+            <a:endParaRPr lang="en-US" dirty="0" smtClean="0"/>
           </a:p>
           <a:p>
             <a:endParaRPr lang="en-US" dirty="0"/>
@@ -3813,16 +4062,21 @@
           <a:bodyPr/>
           <a:lstStyle/>
           <a:p>
-            <a:fld id="{9E3BEF81-0DBD-4698-923F-7BE580063ACF}" type="slidenum">
+            <a:fld id="{F4C4680C-AB34-4D49-99CB-6EC32CE03E33}" type="slidenum">
               <a:rPr lang="en-US" smtClean="0"/>
               <a:pPr/>
-              <a:t>9</a:t>
+              <a:t>8</a:t>
             </a:fld>
             <a:endParaRPr lang="en-US"/>
           </a:p>
         </p:txBody>
       </p:sp>
     </p:spTree>
+    <p:extLst>
+      <p:ext uri="{BB962C8B-B14F-4D97-AF65-F5344CB8AC3E}">
+        <p14:creationId xmlns:p14="http://schemas.microsoft.com/office/powerpoint/2010/main" val="1929375149"/>
+      </p:ext>
+    </p:extLst>
   </p:cSld>
   <p:clrMapOvr>
     <a:masterClrMapping/>
@@ -3876,14 +4130,30 @@
           </a:bodyPr>
           <a:lstStyle/>
           <a:p>
-            <a:r>
-              <a:rPr lang="en-US" dirty="0" err="1" smtClean="0"/>
-              <a:t>Armeen</a:t>
-            </a:r>
+            <a:pPr marL="0" marR="0" indent="0" algn="l" defTabSz="914400" rtl="0" eaLnBrk="1" fontAlgn="auto" latinLnBrk="0" hangingPunct="1">
+              <a:lnSpc>
+                <a:spcPct val="100000"/>
+              </a:lnSpc>
+              <a:spcBef>
+                <a:spcPts val="0"/>
+              </a:spcBef>
+              <a:spcAft>
+                <a:spcPts val="0"/>
+              </a:spcAft>
+              <a:buClrTx/>
+              <a:buSzTx/>
+              <a:buFontTx/>
+              <a:buNone/>
+              <a:tabLst/>
+              <a:defRPr/>
+            </a:pPr>
             <a:r>
               <a:rPr lang="en-US" dirty="0" smtClean="0"/>
-              <a:t> or Nick</a:t>
-            </a:r>
+              <a:t>Nick</a:t>
+            </a:r>
+            <a:endParaRPr lang="en-US" dirty="0" smtClean="0"/>
+          </a:p>
+          <a:p>
             <a:endParaRPr lang="en-US" dirty="0"/>
           </a:p>
         </p:txBody>
@@ -3906,7 +4176,7 @@
             <a:fld id="{9E3BEF81-0DBD-4698-923F-7BE580063ACF}" type="slidenum">
               <a:rPr lang="en-US" smtClean="0"/>
               <a:pPr/>
-              <a:t>10</a:t>
+              <a:t>9</a:t>
             </a:fld>
             <a:endParaRPr lang="en-US"/>
           </a:p>
@@ -7445,7 +7715,7 @@
           <a:noFill/>
           <a:extLst>
             <a:ext uri="{909E8E84-426E-40DD-AFC4-6F175D3DCCD1}">
-              <a14:hiddenFill xmlns:a14="http://schemas.microsoft.com/office/drawing/2010/main" xmlns="">
+              <a14:hiddenFill xmlns:a14="http://schemas.microsoft.com/office/drawing/2010/main">
                 <a:solidFill>
                   <a:srgbClr val="FFFFFF"/>
                 </a:solidFill>
@@ -7474,10 +7744,10 @@
           <p:nvPr/>
         </p:nvPicPr>
         <p:blipFill>
-          <a:blip r:embed="rId2" cstate="print">
+          <a:blip r:embed="rId3" cstate="print">
             <a:extLst>
               <a:ext uri="{28A0092B-C50C-407E-A947-70E740481C1C}">
-                <a14:useLocalDpi xmlns:a14="http://schemas.microsoft.com/office/drawing/2010/main" xmlns="" val="0"/>
+                <a14:useLocalDpi xmlns:a14="http://schemas.microsoft.com/office/drawing/2010/main" val="0"/>
               </a:ext>
             </a:extLst>
           </a:blip>
@@ -7497,7 +7767,7 @@
           <a:noFill/>
           <a:extLst>
             <a:ext uri="{909E8E84-426E-40DD-AFC4-6F175D3DCCD1}">
-              <a14:hiddenFill xmlns:a14="http://schemas.microsoft.com/office/drawing/2010/main" xmlns="">
+              <a14:hiddenFill xmlns:a14="http://schemas.microsoft.com/office/drawing/2010/main">
                 <a:solidFill>
                   <a:srgbClr val="FFFFFF"/>
                 </a:solidFill>
@@ -7618,7 +7888,7 @@
     </p:spTree>
     <p:extLst>
       <p:ext uri="{BB962C8B-B14F-4D97-AF65-F5344CB8AC3E}">
-        <p14:creationId xmlns:p14="http://schemas.microsoft.com/office/powerpoint/2010/main" xmlns="" val="2682577278"/>
+        <p14:creationId xmlns:p14="http://schemas.microsoft.com/office/powerpoint/2010/main" val="2682577278"/>
       </p:ext>
     </p:extLst>
   </p:cSld>
@@ -7768,7 +8038,7 @@
     </p:spTree>
     <p:extLst>
       <p:ext uri="{BB962C8B-B14F-4D97-AF65-F5344CB8AC3E}">
-        <p14:creationId xmlns:p14="http://schemas.microsoft.com/office/powerpoint/2010/main" xmlns="" val="2639847735"/>
+        <p14:creationId xmlns:p14="http://schemas.microsoft.com/office/powerpoint/2010/main" val="2639847735"/>
       </p:ext>
     </p:extLst>
   </p:cSld>
@@ -8001,7 +8271,7 @@
           <a:blip r:embed="rId3" cstate="print">
             <a:extLst>
               <a:ext uri="{28A0092B-C50C-407E-A947-70E740481C1C}">
-                <a14:useLocalDpi xmlns:a14="http://schemas.microsoft.com/office/drawing/2010/main" xmlns="" val="0"/>
+                <a14:useLocalDpi xmlns:a14="http://schemas.microsoft.com/office/drawing/2010/main" val="0"/>
               </a:ext>
             </a:extLst>
           </a:blip>
@@ -8021,7 +8291,7 @@
           <a:noFill/>
           <a:extLst>
             <a:ext uri="{909E8E84-426E-40DD-AFC4-6F175D3DCCD1}">
-              <a14:hiddenFill xmlns:a14="http://schemas.microsoft.com/office/drawing/2010/main" xmlns="">
+              <a14:hiddenFill xmlns:a14="http://schemas.microsoft.com/office/drawing/2010/main">
                 <a:solidFill>
                   <a:srgbClr val="FFFFFF"/>
                 </a:solidFill>
@@ -8042,7 +8312,7 @@
           <a:blip r:embed="rId4" cstate="print">
             <a:extLst>
               <a:ext uri="{28A0092B-C50C-407E-A947-70E740481C1C}">
-                <a14:useLocalDpi xmlns:a14="http://schemas.microsoft.com/office/drawing/2010/main" xmlns="" val="0"/>
+                <a14:useLocalDpi xmlns:a14="http://schemas.microsoft.com/office/drawing/2010/main" val="0"/>
               </a:ext>
             </a:extLst>
           </a:blip>
@@ -8062,7 +8332,7 @@
           <a:noFill/>
           <a:extLst>
             <a:ext uri="{909E8E84-426E-40DD-AFC4-6F175D3DCCD1}">
-              <a14:hiddenFill xmlns:a14="http://schemas.microsoft.com/office/drawing/2010/main" xmlns="">
+              <a14:hiddenFill xmlns:a14="http://schemas.microsoft.com/office/drawing/2010/main">
                 <a:solidFill>
                   <a:srgbClr val="FFFFFF"/>
                 </a:solidFill>
@@ -8083,7 +8353,7 @@
           <a:blip r:embed="rId5" cstate="print">
             <a:extLst>
               <a:ext uri="{28A0092B-C50C-407E-A947-70E740481C1C}">
-                <a14:useLocalDpi xmlns:a14="http://schemas.microsoft.com/office/drawing/2010/main" xmlns="" val="0"/>
+                <a14:useLocalDpi xmlns:a14="http://schemas.microsoft.com/office/drawing/2010/main" val="0"/>
               </a:ext>
             </a:extLst>
           </a:blip>
@@ -8103,7 +8373,7 @@
           <a:noFill/>
           <a:extLst>
             <a:ext uri="{909E8E84-426E-40DD-AFC4-6F175D3DCCD1}">
-              <a14:hiddenFill xmlns:a14="http://schemas.microsoft.com/office/drawing/2010/main" xmlns="">
+              <a14:hiddenFill xmlns:a14="http://schemas.microsoft.com/office/drawing/2010/main">
                 <a:solidFill>
                   <a:srgbClr val="FFFFFF"/>
                 </a:solidFill>
@@ -8124,7 +8394,7 @@
           <a:blip r:embed="rId6" cstate="print">
             <a:extLst>
               <a:ext uri="{28A0092B-C50C-407E-A947-70E740481C1C}">
-                <a14:useLocalDpi xmlns:a14="http://schemas.microsoft.com/office/drawing/2010/main" xmlns="" val="0"/>
+                <a14:useLocalDpi xmlns:a14="http://schemas.microsoft.com/office/drawing/2010/main" val="0"/>
               </a:ext>
             </a:extLst>
           </a:blip>
@@ -8144,7 +8414,7 @@
           <a:noFill/>
           <a:extLst>
             <a:ext uri="{909E8E84-426E-40DD-AFC4-6F175D3DCCD1}">
-              <a14:hiddenFill xmlns:a14="http://schemas.microsoft.com/office/drawing/2010/main" xmlns="">
+              <a14:hiddenFill xmlns:a14="http://schemas.microsoft.com/office/drawing/2010/main">
                 <a:solidFill>
                   <a:srgbClr val="FFFFFF"/>
                 </a:solidFill>
@@ -8165,7 +8435,7 @@
           <a:blip r:embed="rId7" cstate="print">
             <a:extLst>
               <a:ext uri="{28A0092B-C50C-407E-A947-70E740481C1C}">
-                <a14:useLocalDpi xmlns:a14="http://schemas.microsoft.com/office/drawing/2010/main" xmlns="" val="0"/>
+                <a14:useLocalDpi xmlns:a14="http://schemas.microsoft.com/office/drawing/2010/main" val="0"/>
               </a:ext>
             </a:extLst>
           </a:blip>
@@ -8185,7 +8455,7 @@
           <a:noFill/>
           <a:extLst>
             <a:ext uri="{909E8E84-426E-40DD-AFC4-6F175D3DCCD1}">
-              <a14:hiddenFill xmlns:a14="http://schemas.microsoft.com/office/drawing/2010/main" xmlns="">
+              <a14:hiddenFill xmlns:a14="http://schemas.microsoft.com/office/drawing/2010/main">
                 <a:solidFill>
                   <a:srgbClr val="FFFFFF"/>
                 </a:solidFill>
@@ -8263,7 +8533,7 @@
     </p:spTree>
     <p:extLst>
       <p:ext uri="{BB962C8B-B14F-4D97-AF65-F5344CB8AC3E}">
-        <p14:creationId xmlns:p14="http://schemas.microsoft.com/office/powerpoint/2010/main" xmlns="" val="2136212080"/>
+        <p14:creationId xmlns:p14="http://schemas.microsoft.com/office/powerpoint/2010/main" val="2136212080"/>
       </p:ext>
     </p:extLst>
   </p:cSld>
@@ -8467,7 +8737,7 @@
     </p:spTree>
     <p:extLst>
       <p:ext uri="{BB962C8B-B14F-4D97-AF65-F5344CB8AC3E}">
-        <p14:creationId xmlns:p14="http://schemas.microsoft.com/office/powerpoint/2010/main" xmlns="" val="781549472"/>
+        <p14:creationId xmlns:p14="http://schemas.microsoft.com/office/powerpoint/2010/main" val="781549472"/>
       </p:ext>
     </p:extLst>
   </p:cSld>
@@ -8639,7 +8909,7 @@
           <a:blip r:embed="rId3" cstate="print">
             <a:extLst>
               <a:ext uri="{28A0092B-C50C-407E-A947-70E740481C1C}">
-                <a14:useLocalDpi xmlns:a14="http://schemas.microsoft.com/office/drawing/2010/main" xmlns="" val="0"/>
+                <a14:useLocalDpi xmlns:a14="http://schemas.microsoft.com/office/drawing/2010/main" val="0"/>
               </a:ext>
             </a:extLst>
           </a:blip>
@@ -8663,14 +8933,14 @@
           <a:effectLst/>
           <a:extLst>
             <a:ext uri="{909E8E84-426E-40DD-AFC4-6F175D3DCCD1}">
-              <a14:hiddenFill xmlns:a14="http://schemas.microsoft.com/office/drawing/2010/main" xmlns="">
+              <a14:hiddenFill xmlns:a14="http://schemas.microsoft.com/office/drawing/2010/main">
                 <a:solidFill>
                   <a:schemeClr val="accent1"/>
                 </a:solidFill>
               </a14:hiddenFill>
             </a:ext>
             <a:ext uri="{91240B29-F687-4F45-9708-019B960494DF}">
-              <a14:hiddenLine xmlns:a14="http://schemas.microsoft.com/office/drawing/2010/main" xmlns="" w="9525">
+              <a14:hiddenLine xmlns:a14="http://schemas.microsoft.com/office/drawing/2010/main" w="9525">
                 <a:solidFill>
                   <a:schemeClr val="tx1"/>
                 </a:solidFill>
@@ -8680,7 +8950,7 @@
               </a14:hiddenLine>
             </a:ext>
             <a:ext uri="{AF507438-7753-43E0-B8FC-AC1667EBCBE1}">
-              <a14:hiddenEffects xmlns:a14="http://schemas.microsoft.com/office/drawing/2010/main" xmlns="">
+              <a14:hiddenEffects xmlns:a14="http://schemas.microsoft.com/office/drawing/2010/main">
                 <a:effectLst>
                   <a:outerShdw dist="35921" dir="2700000" algn="ctr" rotWithShape="0">
                     <a:schemeClr val="bg2"/>
@@ -8733,7 +9003,7 @@
     </p:spTree>
     <p:extLst>
       <p:ext uri="{BB962C8B-B14F-4D97-AF65-F5344CB8AC3E}">
-        <p14:creationId xmlns:p14="http://schemas.microsoft.com/office/powerpoint/2010/main" xmlns="" val="2853845307"/>
+        <p14:creationId xmlns:p14="http://schemas.microsoft.com/office/powerpoint/2010/main" val="2853845307"/>
       </p:ext>
     </p:extLst>
   </p:cSld>
@@ -8933,13 +9203,8 @@
             </a:r>
             <a:r>
               <a:rPr lang="en-US" dirty="0" smtClean="0"/>
-              <a:t> = </a:t>
-            </a:r>
-            <a:r>
-              <a:rPr lang="en-US" dirty="0" smtClean="0"/>
-              <a:t>312mW/m²</a:t>
-            </a:r>
-            <a:endParaRPr lang="en-US" dirty="0" smtClean="0"/>
+              <a:t> = 312mW/m²</a:t>
+            </a:r>
           </a:p>
           <a:p>
             <a:pPr lvl="1"/>
@@ -9010,7 +9275,7 @@
     </p:spTree>
     <p:extLst>
       <p:ext uri="{BB962C8B-B14F-4D97-AF65-F5344CB8AC3E}">
-        <p14:creationId xmlns:p14="http://schemas.microsoft.com/office/powerpoint/2010/main" xmlns="" val="2417519387"/>
+        <p14:creationId xmlns:p14="http://schemas.microsoft.com/office/powerpoint/2010/main" val="2417519387"/>
       </p:ext>
     </p:extLst>
   </p:cSld>
@@ -9211,7 +9476,7 @@
     </p:spTree>
     <p:extLst>
       <p:ext uri="{BB962C8B-B14F-4D97-AF65-F5344CB8AC3E}">
-        <p14:creationId xmlns:p14="http://schemas.microsoft.com/office/powerpoint/2010/main" xmlns="" val="648595524"/>
+        <p14:creationId xmlns:p14="http://schemas.microsoft.com/office/powerpoint/2010/main" val="648595524"/>
       </p:ext>
     </p:extLst>
   </p:cSld>
@@ -9355,7 +9620,7 @@
           <a:blip r:embed="rId4" cstate="print">
             <a:extLst>
               <a:ext uri="{28A0092B-C50C-407E-A947-70E740481C1C}">
-                <a14:useLocalDpi xmlns:a14="http://schemas.microsoft.com/office/drawing/2010/main" xmlns="" val="0"/>
+                <a14:useLocalDpi xmlns:a14="http://schemas.microsoft.com/office/drawing/2010/main" val="0"/>
               </a:ext>
             </a:extLst>
           </a:blip>
@@ -9375,7 +9640,7 @@
           <a:noFill/>
           <a:extLst>
             <a:ext uri="{909E8E84-426E-40DD-AFC4-6F175D3DCCD1}">
-              <a14:hiddenFill xmlns:a14="http://schemas.microsoft.com/office/drawing/2010/main" xmlns="">
+              <a14:hiddenFill xmlns:a14="http://schemas.microsoft.com/office/drawing/2010/main">
                 <a:solidFill>
                   <a:srgbClr val="FFFFFF"/>
                 </a:solidFill>
@@ -9387,7 +9652,7 @@
     </p:spTree>
     <p:extLst>
       <p:ext uri="{BB962C8B-B14F-4D97-AF65-F5344CB8AC3E}">
-        <p14:creationId xmlns:p14="http://schemas.microsoft.com/office/powerpoint/2010/main" xmlns="" val="2111630316"/>
+        <p14:creationId xmlns:p14="http://schemas.microsoft.com/office/powerpoint/2010/main" val="2111630316"/>
       </p:ext>
     </p:extLst>
   </p:cSld>
@@ -9466,7 +9731,7 @@
           <a:blip r:embed="rId3" cstate="print">
             <a:extLst>
               <a:ext uri="{28A0092B-C50C-407E-A947-70E740481C1C}">
-                <a14:useLocalDpi xmlns:a14="http://schemas.microsoft.com/office/drawing/2010/main" xmlns="" val="0"/>
+                <a14:useLocalDpi xmlns:a14="http://schemas.microsoft.com/office/drawing/2010/main" val="0"/>
               </a:ext>
             </a:extLst>
           </a:blip>
@@ -9486,7 +9751,7 @@
           <a:noFill/>
           <a:extLst>
             <a:ext uri="{909E8E84-426E-40DD-AFC4-6F175D3DCCD1}">
-              <a14:hiddenFill xmlns:a14="http://schemas.microsoft.com/office/drawing/2010/main" xmlns="">
+              <a14:hiddenFill xmlns:a14="http://schemas.microsoft.com/office/drawing/2010/main">
                 <a:solidFill>
                   <a:srgbClr val="FFFFFF"/>
                 </a:solidFill>
@@ -9498,7 +9763,7 @@
     </p:spTree>
     <p:extLst>
       <p:ext uri="{BB962C8B-B14F-4D97-AF65-F5344CB8AC3E}">
-        <p14:creationId xmlns:p14="http://schemas.microsoft.com/office/powerpoint/2010/main" xmlns="" val="3662926366"/>
+        <p14:creationId xmlns:p14="http://schemas.microsoft.com/office/powerpoint/2010/main" val="3662926366"/>
       </p:ext>
     </p:extLst>
   </p:cSld>
@@ -9651,7 +9916,7 @@
     </p:spTree>
     <p:extLst>
       <p:ext uri="{BB962C8B-B14F-4D97-AF65-F5344CB8AC3E}">
-        <p14:creationId xmlns:p14="http://schemas.microsoft.com/office/powerpoint/2010/main" xmlns="" val="661022376"/>
+        <p14:creationId xmlns:p14="http://schemas.microsoft.com/office/powerpoint/2010/main" val="661022376"/>
       </p:ext>
     </p:extLst>
   </p:cSld>
@@ -9768,7 +10033,7 @@
     </p:spTree>
     <p:extLst>
       <p:ext uri="{BB962C8B-B14F-4D97-AF65-F5344CB8AC3E}">
-        <p14:creationId xmlns:p14="http://schemas.microsoft.com/office/powerpoint/2010/main" xmlns="" val="1731753469"/>
+        <p14:creationId xmlns:p14="http://schemas.microsoft.com/office/powerpoint/2010/main" val="1731753469"/>
       </p:ext>
     </p:extLst>
   </p:cSld>
@@ -9901,7 +10166,7 @@
           <a:blip r:embed="rId3" cstate="print">
             <a:extLst>
               <a:ext uri="{28A0092B-C50C-407E-A947-70E740481C1C}">
-                <a14:useLocalDpi xmlns:a14="http://schemas.microsoft.com/office/drawing/2010/main" xmlns="" val="0"/>
+                <a14:useLocalDpi xmlns:a14="http://schemas.microsoft.com/office/drawing/2010/main" val="0"/>
               </a:ext>
             </a:extLst>
           </a:blip>
@@ -9925,14 +10190,14 @@
           <a:effectLst/>
           <a:extLst>
             <a:ext uri="{909E8E84-426E-40DD-AFC4-6F175D3DCCD1}">
-              <a14:hiddenFill xmlns:a14="http://schemas.microsoft.com/office/drawing/2010/main" xmlns="">
+              <a14:hiddenFill xmlns:a14="http://schemas.microsoft.com/office/drawing/2010/main">
                 <a:solidFill>
                   <a:schemeClr val="accent1"/>
                 </a:solidFill>
               </a14:hiddenFill>
             </a:ext>
             <a:ext uri="{91240B29-F687-4F45-9708-019B960494DF}">
-              <a14:hiddenLine xmlns:a14="http://schemas.microsoft.com/office/drawing/2010/main" xmlns="" w="9525">
+              <a14:hiddenLine xmlns:a14="http://schemas.microsoft.com/office/drawing/2010/main" w="9525">
                 <a:solidFill>
                   <a:schemeClr val="tx1"/>
                 </a:solidFill>
@@ -9942,7 +10207,7 @@
               </a14:hiddenLine>
             </a:ext>
             <a:ext uri="{AF507438-7753-43E0-B8FC-AC1667EBCBE1}">
-              <a14:hiddenEffects xmlns:a14="http://schemas.microsoft.com/office/drawing/2010/main" xmlns="">
+              <a14:hiddenEffects xmlns:a14="http://schemas.microsoft.com/office/drawing/2010/main">
                 <a:effectLst>
                   <a:outerShdw dist="35921" dir="2700000" algn="ctr" rotWithShape="0">
                     <a:schemeClr val="bg2"/>
@@ -9956,7 +10221,7 @@
     </p:spTree>
     <p:extLst>
       <p:ext uri="{BB962C8B-B14F-4D97-AF65-F5344CB8AC3E}">
-        <p14:creationId xmlns:p14="http://schemas.microsoft.com/office/powerpoint/2010/main" xmlns="" val="2897909847"/>
+        <p14:creationId xmlns:p14="http://schemas.microsoft.com/office/powerpoint/2010/main" val="2897909847"/>
       </p:ext>
     </p:extLst>
   </p:cSld>
@@ -10047,11 +10312,7 @@
           <a:p>
             <a:r>
               <a:rPr lang="en-US" dirty="0" smtClean="0"/>
-              <a:t>Buck-Boost </a:t>
-            </a:r>
-            <a:r>
-              <a:rPr lang="en-US" dirty="0" smtClean="0"/>
-              <a:t>Converter</a:t>
+              <a:t>Buck-Boost Converter</a:t>
             </a:r>
           </a:p>
           <a:p>
@@ -10082,7 +10343,7 @@
           <a:blip r:embed="rId3" cstate="print">
             <a:extLst>
               <a:ext uri="{28A0092B-C50C-407E-A947-70E740481C1C}">
-                <a14:useLocalDpi xmlns:a14="http://schemas.microsoft.com/office/drawing/2010/main" xmlns="" val="0"/>
+                <a14:useLocalDpi xmlns:a14="http://schemas.microsoft.com/office/drawing/2010/main" val="0"/>
               </a:ext>
             </a:extLst>
           </a:blip>
@@ -10106,14 +10367,14 @@
           <a:effectLst/>
           <a:extLst>
             <a:ext uri="{909E8E84-426E-40DD-AFC4-6F175D3DCCD1}">
-              <a14:hiddenFill xmlns:a14="http://schemas.microsoft.com/office/drawing/2010/main" xmlns="">
+              <a14:hiddenFill xmlns:a14="http://schemas.microsoft.com/office/drawing/2010/main">
                 <a:solidFill>
                   <a:schemeClr val="accent1"/>
                 </a:solidFill>
               </a14:hiddenFill>
             </a:ext>
             <a:ext uri="{91240B29-F687-4F45-9708-019B960494DF}">
-              <a14:hiddenLine xmlns:a14="http://schemas.microsoft.com/office/drawing/2010/main" xmlns="" w="9525">
+              <a14:hiddenLine xmlns:a14="http://schemas.microsoft.com/office/drawing/2010/main" w="9525">
                 <a:solidFill>
                   <a:schemeClr val="tx1"/>
                 </a:solidFill>
@@ -10123,7 +10384,7 @@
               </a14:hiddenLine>
             </a:ext>
             <a:ext uri="{AF507438-7753-43E0-B8FC-AC1667EBCBE1}">
-              <a14:hiddenEffects xmlns:a14="http://schemas.microsoft.com/office/drawing/2010/main" xmlns="">
+              <a14:hiddenEffects xmlns:a14="http://schemas.microsoft.com/office/drawing/2010/main">
                 <a:effectLst>
                   <a:outerShdw dist="35921" dir="2700000" algn="ctr" rotWithShape="0">
                     <a:schemeClr val="bg2"/>
@@ -10137,7 +10398,7 @@
     </p:spTree>
     <p:extLst>
       <p:ext uri="{BB962C8B-B14F-4D97-AF65-F5344CB8AC3E}">
-        <p14:creationId xmlns:p14="http://schemas.microsoft.com/office/powerpoint/2010/main" xmlns="" val="2802167695"/>
+        <p14:creationId xmlns:p14="http://schemas.microsoft.com/office/powerpoint/2010/main" val="2802167695"/>
       </p:ext>
     </p:extLst>
   </p:cSld>
@@ -10290,7 +10551,7 @@
     </p:spTree>
     <p:extLst>
       <p:ext uri="{BB962C8B-B14F-4D97-AF65-F5344CB8AC3E}">
-        <p14:creationId xmlns:p14="http://schemas.microsoft.com/office/powerpoint/2010/main" xmlns="" val="2882000852"/>
+        <p14:creationId xmlns:p14="http://schemas.microsoft.com/office/powerpoint/2010/main" val="2882000852"/>
       </p:ext>
     </p:extLst>
   </p:cSld>
@@ -10415,7 +10676,7 @@
     </p:spTree>
     <p:extLst>
       <p:ext uri="{BB962C8B-B14F-4D97-AF65-F5344CB8AC3E}">
-        <p14:creationId xmlns:p14="http://schemas.microsoft.com/office/powerpoint/2010/main" xmlns="" val="1086218687"/>
+        <p14:creationId xmlns:p14="http://schemas.microsoft.com/office/powerpoint/2010/main" val="1086218687"/>
       </p:ext>
     </p:extLst>
   </p:cSld>
@@ -10494,7 +10755,7 @@
           <a:blip r:embed="rId3" cstate="print">
             <a:extLst>
               <a:ext uri="{28A0092B-C50C-407E-A947-70E740481C1C}">
-                <a14:useLocalDpi xmlns:a14="http://schemas.microsoft.com/office/drawing/2010/main" xmlns="" val="0"/>
+                <a14:useLocalDpi xmlns:a14="http://schemas.microsoft.com/office/drawing/2010/main" val="0"/>
               </a:ext>
             </a:extLst>
           </a:blip>
@@ -10514,7 +10775,7 @@
           <a:noFill/>
           <a:extLst>
             <a:ext uri="{909E8E84-426E-40DD-AFC4-6F175D3DCCD1}">
-              <a14:hiddenFill xmlns:a14="http://schemas.microsoft.com/office/drawing/2010/main" xmlns="">
+              <a14:hiddenFill xmlns:a14="http://schemas.microsoft.com/office/drawing/2010/main">
                 <a:solidFill>
                   <a:srgbClr val="FFFFFF"/>
                 </a:solidFill>
@@ -10526,7 +10787,7 @@
     </p:spTree>
     <p:extLst>
       <p:ext uri="{BB962C8B-B14F-4D97-AF65-F5344CB8AC3E}">
-        <p14:creationId xmlns:p14="http://schemas.microsoft.com/office/powerpoint/2010/main" xmlns="" val="3662926366"/>
+        <p14:creationId xmlns:p14="http://schemas.microsoft.com/office/powerpoint/2010/main" val="3662926366"/>
       </p:ext>
     </p:extLst>
   </p:cSld>
@@ -10676,7 +10937,7 @@
           <a:blip r:embed="rId3" cstate="print">
             <a:extLst>
               <a:ext uri="{28A0092B-C50C-407E-A947-70E740481C1C}">
-                <a14:useLocalDpi xmlns:a14="http://schemas.microsoft.com/office/drawing/2010/main" xmlns="" val="0"/>
+                <a14:useLocalDpi xmlns:a14="http://schemas.microsoft.com/office/drawing/2010/main" val="0"/>
               </a:ext>
             </a:extLst>
           </a:blip>
@@ -10696,7 +10957,7 @@
           <a:noFill/>
           <a:extLst>
             <a:ext uri="{909E8E84-426E-40DD-AFC4-6F175D3DCCD1}">
-              <a14:hiddenFill xmlns:a14="http://schemas.microsoft.com/office/drawing/2010/main" xmlns="">
+              <a14:hiddenFill xmlns:a14="http://schemas.microsoft.com/office/drawing/2010/main">
                 <a:solidFill>
                   <a:srgbClr val="FFFFFF"/>
                 </a:solidFill>
@@ -10717,7 +10978,7 @@
           <a:blip r:embed="rId4" cstate="print">
             <a:extLst>
               <a:ext uri="{28A0092B-C50C-407E-A947-70E740481C1C}">
-                <a14:useLocalDpi xmlns:a14="http://schemas.microsoft.com/office/drawing/2010/main" xmlns="" val="0"/>
+                <a14:useLocalDpi xmlns:a14="http://schemas.microsoft.com/office/drawing/2010/main" val="0"/>
               </a:ext>
             </a:extLst>
           </a:blip>
@@ -10737,7 +10998,7 @@
           <a:noFill/>
           <a:extLst>
             <a:ext uri="{909E8E84-426E-40DD-AFC4-6F175D3DCCD1}">
-              <a14:hiddenFill xmlns:a14="http://schemas.microsoft.com/office/drawing/2010/main" xmlns="">
+              <a14:hiddenFill xmlns:a14="http://schemas.microsoft.com/office/drawing/2010/main">
                 <a:solidFill>
                   <a:srgbClr val="FFFFFF"/>
                 </a:solidFill>
@@ -10749,7 +11010,7 @@
     </p:spTree>
     <p:extLst>
       <p:ext uri="{BB962C8B-B14F-4D97-AF65-F5344CB8AC3E}">
-        <p14:creationId xmlns:p14="http://schemas.microsoft.com/office/powerpoint/2010/main" xmlns="" val="1355237181"/>
+        <p14:creationId xmlns:p14="http://schemas.microsoft.com/office/powerpoint/2010/main" val="1355237181"/>
       </p:ext>
     </p:extLst>
   </p:cSld>
@@ -10886,7 +11147,7 @@
     </p:spTree>
     <p:extLst>
       <p:ext uri="{BB962C8B-B14F-4D97-AF65-F5344CB8AC3E}">
-        <p14:creationId xmlns:p14="http://schemas.microsoft.com/office/powerpoint/2010/main" xmlns="" val="2750263720"/>
+        <p14:creationId xmlns:p14="http://schemas.microsoft.com/office/powerpoint/2010/main" val="2750263720"/>
       </p:ext>
     </p:extLst>
   </p:cSld>
@@ -11042,7 +11303,7 @@
           <a:blip r:embed="rId3" cstate="print">
             <a:extLst>
               <a:ext uri="{28A0092B-C50C-407E-A947-70E740481C1C}">
-                <a14:useLocalDpi xmlns:a14="http://schemas.microsoft.com/office/drawing/2010/main" xmlns="" val="0"/>
+                <a14:useLocalDpi xmlns:a14="http://schemas.microsoft.com/office/drawing/2010/main" val="0"/>
               </a:ext>
             </a:extLst>
           </a:blip>
@@ -11066,14 +11327,14 @@
           <a:effectLst/>
           <a:extLst>
             <a:ext uri="{909E8E84-426E-40DD-AFC4-6F175D3DCCD1}">
-              <a14:hiddenFill xmlns:a14="http://schemas.microsoft.com/office/drawing/2010/main" xmlns="">
+              <a14:hiddenFill xmlns:a14="http://schemas.microsoft.com/office/drawing/2010/main">
                 <a:solidFill>
                   <a:schemeClr val="accent1"/>
                 </a:solidFill>
               </a14:hiddenFill>
             </a:ext>
             <a:ext uri="{91240B29-F687-4F45-9708-019B960494DF}">
-              <a14:hiddenLine xmlns:a14="http://schemas.microsoft.com/office/drawing/2010/main" xmlns="" w="9525">
+              <a14:hiddenLine xmlns:a14="http://schemas.microsoft.com/office/drawing/2010/main" w="9525">
                 <a:solidFill>
                   <a:schemeClr val="tx1"/>
                 </a:solidFill>
@@ -11083,7 +11344,7 @@
               </a14:hiddenLine>
             </a:ext>
             <a:ext uri="{AF507438-7753-43E0-B8FC-AC1667EBCBE1}">
-              <a14:hiddenEffects xmlns:a14="http://schemas.microsoft.com/office/drawing/2010/main" xmlns="">
+              <a14:hiddenEffects xmlns:a14="http://schemas.microsoft.com/office/drawing/2010/main">
                 <a:effectLst>
                   <a:outerShdw dist="35921" dir="2700000" algn="ctr" rotWithShape="0">
                     <a:schemeClr val="bg2"/>
@@ -11097,7 +11358,7 @@
     </p:spTree>
     <p:extLst>
       <p:ext uri="{BB962C8B-B14F-4D97-AF65-F5344CB8AC3E}">
-        <p14:creationId xmlns:p14="http://schemas.microsoft.com/office/powerpoint/2010/main" xmlns="" val="3459616267"/>
+        <p14:creationId xmlns:p14="http://schemas.microsoft.com/office/powerpoint/2010/main" val="3459616267"/>
       </p:ext>
     </p:extLst>
   </p:cSld>
@@ -11192,15 +11453,7 @@
           <a:p>
             <a:r>
               <a:rPr lang="en-US" dirty="0" smtClean="0"/>
-              <a:t>High speed signals if our team designs </a:t>
-            </a:r>
-            <a:r>
-              <a:rPr lang="en-US" dirty="0" smtClean="0"/>
-              <a:t>our </a:t>
-            </a:r>
-            <a:r>
-              <a:rPr lang="en-US" dirty="0" smtClean="0"/>
-              <a:t>own board for the ARM</a:t>
+              <a:t>High speed signals if our team designs our own board for the ARM</a:t>
             </a:r>
           </a:p>
           <a:p>
@@ -11214,8 +11467,13 @@
             <a:pPr lvl="1"/>
             <a:r>
               <a:rPr lang="en-US" dirty="0" smtClean="0"/>
-              <a:t>Finding a high speed arm that is not a BGA</a:t>
-            </a:r>
+              <a:t>Finding a high speed arm that is not a </a:t>
+            </a:r>
+            <a:r>
+              <a:rPr lang="en-US" dirty="0" smtClean="0"/>
+              <a:t>BGA</a:t>
+            </a:r>
+            <a:endParaRPr lang="en-US" dirty="0" smtClean="0"/>
           </a:p>
           <a:p>
             <a:endParaRPr lang="en-US" dirty="0" smtClean="0"/>
@@ -11225,7 +11483,7 @@
     </p:spTree>
     <p:extLst>
       <p:ext uri="{BB962C8B-B14F-4D97-AF65-F5344CB8AC3E}">
-        <p14:creationId xmlns:p14="http://schemas.microsoft.com/office/powerpoint/2010/main" xmlns="" val="3603081875"/>
+        <p14:creationId xmlns:p14="http://schemas.microsoft.com/office/powerpoint/2010/main" val="3603081875"/>
       </p:ext>
     </p:extLst>
   </p:cSld>
@@ -11269,16 +11527,22 @@
             <p:ph type="title"/>
           </p:nvPr>
         </p:nvSpPr>
-        <p:spPr/>
+        <p:spPr>
+          <a:xfrm>
+            <a:off x="442043" y="8586"/>
+            <a:ext cx="8229600" cy="1399032"/>
+          </a:xfrm>
+        </p:spPr>
         <p:txBody>
           <a:bodyPr/>
           <a:lstStyle/>
           <a:p>
+            <a:pPr algn="ctr"/>
             <a:r>
               <a:rPr lang="en-US" dirty="0" smtClean="0">
                 <a:effectLst/>
               </a:rPr>
-              <a:t>Camera</a:t>
+              <a:t>System Block Diagram</a:t>
             </a:r>
             <a:endParaRPr lang="en-US" dirty="0">
               <a:effectLst/>
@@ -11286,103 +11550,9 @@
           </a:p>
         </p:txBody>
       </p:sp>
-      <p:sp>
-        <p:nvSpPr>
-          <p:cNvPr id="3" name="Content Placeholder 2"/>
-          <p:cNvSpPr>
-            <a:spLocks noGrp="1"/>
-          </p:cNvSpPr>
-          <p:nvPr>
-            <p:ph idx="1"/>
-          </p:nvPr>
-        </p:nvSpPr>
-        <p:spPr>
-          <a:xfrm>
-            <a:off x="0" y="1600200"/>
-            <a:ext cx="8229600" cy="4572000"/>
-          </a:xfrm>
-        </p:spPr>
-        <p:txBody>
-          <a:bodyPr/>
-          <a:lstStyle/>
-          <a:p>
-            <a:r>
-              <a:rPr lang="en-US" dirty="0" smtClean="0"/>
-              <a:t>Used to record movements of the eye</a:t>
-            </a:r>
-          </a:p>
-          <a:p>
-            <a:r>
-              <a:rPr lang="en-US" dirty="0" smtClean="0"/>
-              <a:t>Tentative Camera</a:t>
-            </a:r>
-          </a:p>
-          <a:p>
-            <a:pPr lvl="1"/>
-            <a:r>
-              <a:rPr lang="en-US" dirty="0" smtClean="0"/>
-              <a:t>TCM8230MD CMOS Camera</a:t>
-            </a:r>
-          </a:p>
-          <a:p>
-            <a:pPr lvl="1"/>
-            <a:r>
-              <a:rPr lang="en-US" dirty="0" smtClean="0"/>
-              <a:t>Small, ideal for a wearable device</a:t>
-            </a:r>
-          </a:p>
-          <a:p>
-            <a:pPr lvl="1"/>
-            <a:r>
-              <a:rPr lang="en-US" dirty="0" smtClean="0"/>
-              <a:t>640 x 480 Pixel Resolution (VGA)</a:t>
-            </a:r>
-          </a:p>
-          <a:p>
-            <a:pPr lvl="1"/>
-            <a:r>
-              <a:rPr lang="en-US" dirty="0" smtClean="0"/>
-              <a:t>30 FPS (Frames </a:t>
-            </a:r>
-            <a:r>
-              <a:rPr lang="en-US" dirty="0"/>
-              <a:t>P</a:t>
-            </a:r>
-            <a:r>
-              <a:rPr lang="en-US" dirty="0" smtClean="0"/>
-              <a:t>er Second)</a:t>
-            </a:r>
-          </a:p>
-          <a:p>
-            <a:pPr lvl="1"/>
-            <a:r>
-              <a:rPr lang="en-US" dirty="0" smtClean="0"/>
-              <a:t>Command I/O 12C</a:t>
-            </a:r>
-          </a:p>
-          <a:p>
-            <a:pPr lvl="1"/>
-            <a:r>
-              <a:rPr lang="en-US" dirty="0" smtClean="0"/>
-              <a:t>Data Output 8-bit Parallel (YUV or RGB)</a:t>
-            </a:r>
-          </a:p>
-          <a:p>
-            <a:pPr lvl="1"/>
-            <a:r>
-              <a:rPr lang="en-US" dirty="0" smtClean="0"/>
-              <a:t>Data Output Rate 144kbps</a:t>
-            </a:r>
-            <a:endParaRPr lang="en-US" dirty="0"/>
-          </a:p>
-          <a:p>
-            <a:endParaRPr lang="en-US" dirty="0" smtClean="0"/>
-          </a:p>
-        </p:txBody>
-      </p:sp>
       <p:pic>
         <p:nvPicPr>
-          <p:cNvPr id="4" name="Picture 2"/>
+          <p:cNvPr id="1026" name="Picture 2" descr="D:\Documents\School\capstone\eyecu\flowcharts\mainsystem.wmf"/>
           <p:cNvPicPr>
             <a:picLocks noChangeAspect="1" noChangeArrowheads="1"/>
           </p:cNvPicPr>
@@ -11392,7 +11562,7 @@
           <a:blip r:embed="rId3" cstate="print">
             <a:extLst>
               <a:ext uri="{28A0092B-C50C-407E-A947-70E740481C1C}">
-                <a14:useLocalDpi xmlns:a14="http://schemas.microsoft.com/office/drawing/2010/main" xmlns="" val="0"/>
+                <a14:useLocalDpi xmlns:a14="http://schemas.microsoft.com/office/drawing/2010/main" val="0"/>
               </a:ext>
             </a:extLst>
           </a:blip>
@@ -11403,43 +11573,20 @@
         </p:blipFill>
         <p:spPr bwMode="auto">
           <a:xfrm>
-            <a:off x="5638800" y="2286000"/>
-            <a:ext cx="3310013" cy="2590800"/>
+            <a:off x="474403" y="1538204"/>
+            <a:ext cx="8440997" cy="4405396"/>
           </a:xfrm>
           <a:prstGeom prst="rect">
             <a:avLst/>
           </a:prstGeom>
           <a:noFill/>
-          <a:ln>
-            <a:noFill/>
-          </a:ln>
-          <a:effectLst/>
           <a:extLst>
             <a:ext uri="{909E8E84-426E-40DD-AFC4-6F175D3DCCD1}">
-              <a14:hiddenFill xmlns:a14="http://schemas.microsoft.com/office/drawing/2010/main" xmlns="">
+              <a14:hiddenFill xmlns:a14="http://schemas.microsoft.com/office/drawing/2010/main">
                 <a:solidFill>
-                  <a:schemeClr val="accent1"/>
+                  <a:srgbClr val="FFFFFF"/>
                 </a:solidFill>
               </a14:hiddenFill>
-            </a:ext>
-            <a:ext uri="{91240B29-F687-4F45-9708-019B960494DF}">
-              <a14:hiddenLine xmlns:a14="http://schemas.microsoft.com/office/drawing/2010/main" xmlns="" w="9525">
-                <a:solidFill>
-                  <a:schemeClr val="tx1"/>
-                </a:solidFill>
-                <a:miter lim="800000"/>
-                <a:headEnd/>
-                <a:tailEnd/>
-              </a14:hiddenLine>
-            </a:ext>
-            <a:ext uri="{AF507438-7753-43E0-B8FC-AC1667EBCBE1}">
-              <a14:hiddenEffects xmlns:a14="http://schemas.microsoft.com/office/drawing/2010/main" xmlns="">
-                <a:effectLst>
-                  <a:outerShdw dist="35921" dir="2700000" algn="ctr" rotWithShape="0">
-                    <a:schemeClr val="bg2"/>
-                  </a:outerShdw>
-                </a:effectLst>
-              </a14:hiddenEffects>
             </a:ext>
           </a:extLst>
         </p:spPr>
@@ -11447,7 +11594,7 @@
     </p:spTree>
     <p:extLst>
       <p:ext uri="{BB962C8B-B14F-4D97-AF65-F5344CB8AC3E}">
-        <p14:creationId xmlns:p14="http://schemas.microsoft.com/office/powerpoint/2010/main" xmlns="" val="247184147"/>
+        <p14:creationId xmlns:p14="http://schemas.microsoft.com/office/powerpoint/2010/main" val="1509315739"/>
       </p:ext>
     </p:extLst>
   </p:cSld>
@@ -11558,7 +11705,7 @@
     </p:spTree>
     <p:extLst>
       <p:ext uri="{BB962C8B-B14F-4D97-AF65-F5344CB8AC3E}">
-        <p14:creationId xmlns:p14="http://schemas.microsoft.com/office/powerpoint/2010/main" xmlns="" val="2702196309"/>
+        <p14:creationId xmlns:p14="http://schemas.microsoft.com/office/powerpoint/2010/main" val="2702196309"/>
       </p:ext>
     </p:extLst>
   </p:cSld>
@@ -11611,7 +11758,7 @@
               <a:rPr lang="en-US" dirty="0" smtClean="0">
                 <a:effectLst/>
               </a:rPr>
-              <a:t>Camera</a:t>
+              <a:t>Wireless</a:t>
             </a:r>
             <a:endParaRPr lang="en-US" dirty="0">
               <a:effectLst/>
@@ -11637,95 +11784,62 @@
         </p:spPr>
         <p:txBody>
           <a:bodyPr>
-            <a:normAutofit fontScale="92500" lnSpcReduction="10000"/>
+            <a:normAutofit/>
           </a:bodyPr>
           <a:lstStyle/>
           <a:p>
             <a:r>
               <a:rPr lang="en-US" dirty="0" smtClean="0"/>
-              <a:t>Controlled across 12C (</a:t>
-            </a:r>
+              <a:t>Transmit camera data to host controller</a:t>
+            </a:r>
+          </a:p>
+          <a:p>
             <a:r>
               <a:rPr lang="en-US" dirty="0" err="1" smtClean="0"/>
-              <a:t>uC</a:t>
+              <a:t>Xbee</a:t>
             </a:r>
             <a:r>
               <a:rPr lang="en-US" dirty="0" smtClean="0"/>
-              <a:t> GPIO)</a:t>
-            </a:r>
-          </a:p>
-          <a:p>
+              <a:t> Series 1 Chip</a:t>
+            </a:r>
+          </a:p>
+          <a:p>
+            <a:pPr lvl="1"/>
             <a:r>
               <a:rPr lang="en-US" dirty="0" smtClean="0"/>
-              <a:t>Synchronization</a:t>
-            </a:r>
-          </a:p>
-          <a:p>
+              <a:t>Range 100m</a:t>
+            </a:r>
+          </a:p>
+          <a:p>
+            <a:pPr lvl="1"/>
             <a:r>
               <a:rPr lang="en-US" dirty="0" smtClean="0"/>
-              <a:t>Data Output 8-bit</a:t>
+              <a:t>RF Data Rate 250 kbps</a:t>
             </a:r>
           </a:p>
           <a:p>
             <a:pPr lvl="1"/>
             <a:r>
               <a:rPr lang="en-US" dirty="0" smtClean="0"/>
-              <a:t>Buffer</a:t>
+              <a:t>Serial Data Rate 1200 bps – 250 kbps</a:t>
             </a:r>
           </a:p>
           <a:p>
             <a:pPr lvl="1"/>
             <a:r>
+              <a:rPr lang="en-US" dirty="0" err="1" smtClean="0"/>
+              <a:t>Xbee</a:t>
+            </a:r>
+            <a:r>
               <a:rPr lang="en-US" dirty="0" smtClean="0"/>
-              <a:t>Hardware Solution</a:t>
+              <a:t> Explorer USB</a:t>
             </a:r>
           </a:p>
           <a:p>
             <a:pPr lvl="2"/>
             <a:r>
               <a:rPr lang="en-US" dirty="0" smtClean="0"/>
-              <a:t>Shift Registers -&gt; Serial</a:t>
-            </a:r>
-          </a:p>
-          <a:p>
-            <a:pPr lvl="2"/>
-            <a:r>
-              <a:rPr lang="en-US" dirty="0" smtClean="0"/>
-              <a:t>Latch -&gt; Storage Management</a:t>
-            </a:r>
-          </a:p>
-          <a:p>
-            <a:pPr lvl="2"/>
-            <a:r>
-              <a:rPr lang="en-US" dirty="0" smtClean="0"/>
-              <a:t>Read from buffer into </a:t>
-            </a:r>
-            <a:r>
-              <a:rPr lang="en-US" dirty="0" err="1" smtClean="0"/>
-              <a:t>uC</a:t>
-            </a:r>
-            <a:endParaRPr lang="en-US" dirty="0" smtClean="0"/>
-          </a:p>
-          <a:p>
-            <a:pPr lvl="1"/>
-            <a:r>
-              <a:rPr lang="en-US" dirty="0" smtClean="0"/>
-              <a:t>Additional Microcontroller Solution</a:t>
-            </a:r>
-          </a:p>
-          <a:p>
-            <a:pPr lvl="2"/>
-            <a:r>
-              <a:rPr lang="en-US" dirty="0" smtClean="0"/>
-              <a:t>Use </a:t>
-            </a:r>
-            <a:r>
-              <a:rPr lang="en-US" dirty="0" err="1" smtClean="0"/>
-              <a:t>uC</a:t>
-            </a:r>
-            <a:r>
-              <a:rPr lang="en-US" dirty="0" smtClean="0"/>
-              <a:t> to provide 8-bit Parallel Interface with other synchronization signals and command</a:t>
+              <a:t>Quick Development</a:t>
             </a:r>
           </a:p>
           <a:p>
@@ -11738,7 +11852,7 @@
       </p:sp>
       <p:pic>
         <p:nvPicPr>
-          <p:cNvPr id="4" name="Picture 2"/>
+          <p:cNvPr id="5" name="Picture 2"/>
           <p:cNvPicPr>
             <a:picLocks noChangeAspect="1" noChangeArrowheads="1"/>
           </p:cNvPicPr>
@@ -11748,7 +11862,7 @@
           <a:blip r:embed="rId3" cstate="print">
             <a:extLst>
               <a:ext uri="{28A0092B-C50C-407E-A947-70E740481C1C}">
-                <a14:useLocalDpi xmlns:a14="http://schemas.microsoft.com/office/drawing/2010/main" xmlns="" val="0"/>
+                <a14:useLocalDpi xmlns:a14="http://schemas.microsoft.com/office/drawing/2010/main" val="0"/>
               </a:ext>
             </a:extLst>
           </a:blip>
@@ -11759,8 +11873,8 @@
         </p:blipFill>
         <p:spPr bwMode="auto">
           <a:xfrm>
-            <a:off x="5638800" y="2286000"/>
-            <a:ext cx="3310013" cy="2590800"/>
+            <a:off x="6096000" y="4109854"/>
+            <a:ext cx="2905123" cy="2595746"/>
           </a:xfrm>
           <a:prstGeom prst="rect">
             <a:avLst/>
@@ -11772,14 +11886,14 @@
           <a:effectLst/>
           <a:extLst>
             <a:ext uri="{909E8E84-426E-40DD-AFC4-6F175D3DCCD1}">
-              <a14:hiddenFill xmlns:a14="http://schemas.microsoft.com/office/drawing/2010/main" xmlns="">
+              <a14:hiddenFill xmlns:a14="http://schemas.microsoft.com/office/drawing/2010/main">
                 <a:solidFill>
                   <a:schemeClr val="accent1"/>
                 </a:solidFill>
               </a14:hiddenFill>
             </a:ext>
             <a:ext uri="{91240B29-F687-4F45-9708-019B960494DF}">
-              <a14:hiddenLine xmlns:a14="http://schemas.microsoft.com/office/drawing/2010/main" xmlns="" w="9525">
+              <a14:hiddenLine xmlns:a14="http://schemas.microsoft.com/office/drawing/2010/main" w="9525">
                 <a:solidFill>
                   <a:schemeClr val="tx1"/>
                 </a:solidFill>
@@ -11789,7 +11903,7 @@
               </a14:hiddenLine>
             </a:ext>
             <a:ext uri="{AF507438-7753-43E0-B8FC-AC1667EBCBE1}">
-              <a14:hiddenEffects xmlns:a14="http://schemas.microsoft.com/office/drawing/2010/main" xmlns="">
+              <a14:hiddenEffects xmlns:a14="http://schemas.microsoft.com/office/drawing/2010/main">
                 <a:effectLst>
                   <a:outerShdw dist="35921" dir="2700000" algn="ctr" rotWithShape="0">
                     <a:schemeClr val="bg2"/>
@@ -11803,7 +11917,7 @@
     </p:spTree>
     <p:extLst>
       <p:ext uri="{BB962C8B-B14F-4D97-AF65-F5344CB8AC3E}">
-        <p14:creationId xmlns:p14="http://schemas.microsoft.com/office/powerpoint/2010/main" xmlns="" val="3764113509"/>
+        <p14:creationId xmlns:p14="http://schemas.microsoft.com/office/powerpoint/2010/main" val="1990879506"/>
       </p:ext>
     </p:extLst>
   </p:cSld>
@@ -11849,7 +11963,7 @@
         </p:nvSpPr>
         <p:spPr>
           <a:xfrm>
-            <a:off x="457200" y="-304800"/>
+            <a:off x="457200" y="0"/>
             <a:ext cx="8229600" cy="1399032"/>
           </a:xfrm>
         </p:spPr>
@@ -11862,7 +11976,7 @@
               <a:rPr lang="en-US" dirty="0" smtClean="0">
                 <a:effectLst/>
               </a:rPr>
-              <a:t>Camera Block Diagram</a:t>
+              <a:t>Wireless Block Diagram</a:t>
             </a:r>
             <a:endParaRPr lang="en-US" dirty="0">
               <a:effectLst/>
@@ -11872,7 +11986,7 @@
       </p:sp>
       <p:pic>
         <p:nvPicPr>
-          <p:cNvPr id="3077" name="Picture 5" descr="C:\Users\Khashi\Desktop\cameraboard (1).wmf"/>
+          <p:cNvPr id="7170" name="Picture 2" descr="C:\Users\Khashi\Desktop\wireless.wmf"/>
           <p:cNvPicPr>
             <a:picLocks noChangeAspect="1" noChangeArrowheads="1"/>
           </p:cNvPicPr>
@@ -11886,8 +12000,8 @@
         </p:blipFill>
         <p:spPr bwMode="auto">
           <a:xfrm>
-            <a:off x="1195699" y="762001"/>
-            <a:ext cx="6697951" cy="6087414"/>
+            <a:off x="81133" y="1981200"/>
+            <a:ext cx="8986666" cy="3392719"/>
           </a:xfrm>
           <a:prstGeom prst="rect">
             <a:avLst/>
@@ -11895,7 +12009,7 @@
           <a:noFill/>
           <a:extLst>
             <a:ext uri="{909E8E84-426E-40DD-AFC4-6F175D3DCCD1}">
-              <a14:hiddenFill xmlns:a14="http://schemas.microsoft.com/office/drawing/2010/main" xmlns="">
+              <a14:hiddenFill xmlns:a14="http://schemas.microsoft.com/office/drawing/2010/main">
                 <a:solidFill>
                   <a:srgbClr val="FFFFFF"/>
                 </a:solidFill>
@@ -11907,7 +12021,7 @@
     </p:spTree>
     <p:extLst>
       <p:ext uri="{BB962C8B-B14F-4D97-AF65-F5344CB8AC3E}">
-        <p14:creationId xmlns:p14="http://schemas.microsoft.com/office/powerpoint/2010/main" xmlns="" val="1436569290"/>
+        <p14:creationId xmlns:p14="http://schemas.microsoft.com/office/powerpoint/2010/main" val="2188812827"/>
       </p:ext>
     </p:extLst>
   </p:cSld>
@@ -11951,22 +12065,16 @@
             <p:ph type="title"/>
           </p:nvPr>
         </p:nvSpPr>
-        <p:spPr>
-          <a:xfrm>
-            <a:off x="442043" y="8586"/>
-            <a:ext cx="8229600" cy="1399032"/>
-          </a:xfrm>
-        </p:spPr>
+        <p:spPr/>
         <p:txBody>
           <a:bodyPr/>
           <a:lstStyle/>
           <a:p>
-            <a:pPr algn="ctr"/>
             <a:r>
               <a:rPr lang="en-US" dirty="0" smtClean="0">
                 <a:effectLst/>
               </a:rPr>
-              <a:t>System Block Diagram</a:t>
+              <a:t>Risk</a:t>
             </a:r>
             <a:endParaRPr lang="en-US" dirty="0">
               <a:effectLst/>
@@ -11974,9 +12082,66 @@
           </a:p>
         </p:txBody>
       </p:sp>
+      <p:sp>
+        <p:nvSpPr>
+          <p:cNvPr id="3" name="Content Placeholder 2"/>
+          <p:cNvSpPr>
+            <a:spLocks noGrp="1"/>
+          </p:cNvSpPr>
+          <p:nvPr>
+            <p:ph idx="1"/>
+          </p:nvPr>
+        </p:nvSpPr>
+        <p:spPr>
+          <a:xfrm>
+            <a:off x="457200" y="1600200"/>
+            <a:ext cx="8229600" cy="4572000"/>
+          </a:xfrm>
+        </p:spPr>
+        <p:txBody>
+          <a:bodyPr>
+            <a:normAutofit/>
+          </a:bodyPr>
+          <a:lstStyle/>
+          <a:p>
+            <a:r>
+              <a:rPr lang="en-US" dirty="0" smtClean="0"/>
+              <a:t>Insufficient transmit speed</a:t>
+            </a:r>
+          </a:p>
+          <a:p>
+            <a:r>
+              <a:rPr lang="en-US" dirty="0" smtClean="0"/>
+              <a:t>RF </a:t>
+            </a:r>
+            <a:r>
+              <a:rPr lang="en-US" dirty="0" smtClean="0"/>
+              <a:t>Exposure (Time and Distance)</a:t>
+            </a:r>
+          </a:p>
+          <a:p>
+            <a:pPr lvl="1"/>
+            <a:r>
+              <a:rPr lang="en-US" dirty="0" smtClean="0"/>
+              <a:t>1mW </a:t>
+            </a:r>
+            <a:r>
+              <a:rPr lang="en-US" dirty="0" smtClean="0"/>
+              <a:t>Wireless</a:t>
+            </a:r>
+            <a:endParaRPr lang="en-US" dirty="0"/>
+          </a:p>
+          <a:p>
+            <a:pPr marL="537210" lvl="1" indent="0">
+              <a:buNone/>
+            </a:pPr>
+            <a:endParaRPr lang="en-US" dirty="0" smtClean="0"/>
+          </a:p>
+        </p:txBody>
+      </p:sp>
       <p:pic>
         <p:nvPicPr>
-          <p:cNvPr id="1026" name="Picture 2" descr="D:\Documents\School\capstone\eyecu\flowcharts\mainsystem.wmf"/>
+          <p:cNvPr id="5" name="Picture 2"/>
           <p:cNvPicPr>
             <a:picLocks noChangeAspect="1" noChangeArrowheads="1"/>
           </p:cNvPicPr>
@@ -11986,7 +12151,7 @@
           <a:blip r:embed="rId3" cstate="print">
             <a:extLst>
               <a:ext uri="{28A0092B-C50C-407E-A947-70E740481C1C}">
-                <a14:useLocalDpi xmlns:a14="http://schemas.microsoft.com/office/drawing/2010/main" xmlns="" val="0"/>
+                <a14:useLocalDpi xmlns:a14="http://schemas.microsoft.com/office/drawing/2010/main" val="0"/>
               </a:ext>
             </a:extLst>
           </a:blip>
@@ -11997,20 +12162,43 @@
         </p:blipFill>
         <p:spPr bwMode="auto">
           <a:xfrm>
-            <a:off x="474403" y="1538204"/>
-            <a:ext cx="8440997" cy="4405396"/>
+            <a:off x="6019800" y="4114800"/>
+            <a:ext cx="2905123" cy="2595746"/>
           </a:xfrm>
           <a:prstGeom prst="rect">
             <a:avLst/>
           </a:prstGeom>
           <a:noFill/>
+          <a:ln>
+            <a:noFill/>
+          </a:ln>
+          <a:effectLst/>
           <a:extLst>
             <a:ext uri="{909E8E84-426E-40DD-AFC4-6F175D3DCCD1}">
-              <a14:hiddenFill xmlns:a14="http://schemas.microsoft.com/office/drawing/2010/main" xmlns="">
+              <a14:hiddenFill xmlns:a14="http://schemas.microsoft.com/office/drawing/2010/main">
                 <a:solidFill>
-                  <a:srgbClr val="FFFFFF"/>
+                  <a:schemeClr val="accent1"/>
                 </a:solidFill>
               </a14:hiddenFill>
+            </a:ext>
+            <a:ext uri="{91240B29-F687-4F45-9708-019B960494DF}">
+              <a14:hiddenLine xmlns:a14="http://schemas.microsoft.com/office/drawing/2010/main" w="9525">
+                <a:solidFill>
+                  <a:schemeClr val="tx1"/>
+                </a:solidFill>
+                <a:miter lim="800000"/>
+                <a:headEnd/>
+                <a:tailEnd/>
+              </a14:hiddenLine>
+            </a:ext>
+            <a:ext uri="{AF507438-7753-43E0-B8FC-AC1667EBCBE1}">
+              <a14:hiddenEffects xmlns:a14="http://schemas.microsoft.com/office/drawing/2010/main">
+                <a:effectLst>
+                  <a:outerShdw dist="35921" dir="2700000" algn="ctr" rotWithShape="0">
+                    <a:schemeClr val="bg2"/>
+                  </a:outerShdw>
+                </a:effectLst>
+              </a14:hiddenEffects>
             </a:ext>
           </a:extLst>
         </p:spPr>
@@ -12018,7 +12206,7 @@
     </p:spTree>
     <p:extLst>
       <p:ext uri="{BB962C8B-B14F-4D97-AF65-F5344CB8AC3E}">
-        <p14:creationId xmlns:p14="http://schemas.microsoft.com/office/powerpoint/2010/main" xmlns="" val="3662926366"/>
+        <p14:creationId xmlns:p14="http://schemas.microsoft.com/office/powerpoint/2010/main" val="3718507861"/>
       </p:ext>
     </p:extLst>
   </p:cSld>
@@ -12062,16 +12250,22 @@
             <p:ph type="title"/>
           </p:nvPr>
         </p:nvSpPr>
-        <p:spPr/>
+        <p:spPr>
+          <a:xfrm>
+            <a:off x="442043" y="8586"/>
+            <a:ext cx="8229600" cy="1399032"/>
+          </a:xfrm>
+        </p:spPr>
         <p:txBody>
           <a:bodyPr/>
           <a:lstStyle/>
           <a:p>
+            <a:pPr algn="ctr"/>
             <a:r>
               <a:rPr lang="en-US" dirty="0" smtClean="0">
                 <a:effectLst/>
               </a:rPr>
-              <a:t>Wireless</a:t>
+              <a:t>System Block Diagram</a:t>
             </a:r>
             <a:endParaRPr lang="en-US" dirty="0">
               <a:effectLst/>
@@ -12079,93 +12273,9 @@
           </a:p>
         </p:txBody>
       </p:sp>
-      <p:sp>
-        <p:nvSpPr>
-          <p:cNvPr id="3" name="Content Placeholder 2"/>
-          <p:cNvSpPr>
-            <a:spLocks noGrp="1"/>
-          </p:cNvSpPr>
-          <p:nvPr>
-            <p:ph idx="1"/>
-          </p:nvPr>
-        </p:nvSpPr>
-        <p:spPr>
-          <a:xfrm>
-            <a:off x="0" y="1600200"/>
-            <a:ext cx="8229600" cy="4572000"/>
-          </a:xfrm>
-        </p:spPr>
-        <p:txBody>
-          <a:bodyPr>
-            <a:normAutofit/>
-          </a:bodyPr>
-          <a:lstStyle/>
-          <a:p>
-            <a:r>
-              <a:rPr lang="en-US" dirty="0" smtClean="0"/>
-              <a:t>Transmit camera data to host controller</a:t>
-            </a:r>
-          </a:p>
-          <a:p>
-            <a:r>
-              <a:rPr lang="en-US" dirty="0" err="1" smtClean="0"/>
-              <a:t>Xbee</a:t>
-            </a:r>
-            <a:r>
-              <a:rPr lang="en-US" dirty="0" smtClean="0"/>
-              <a:t> Series 1 Chip</a:t>
-            </a:r>
-          </a:p>
-          <a:p>
-            <a:pPr lvl="1"/>
-            <a:r>
-              <a:rPr lang="en-US" dirty="0" smtClean="0"/>
-              <a:t>Range 100m</a:t>
-            </a:r>
-          </a:p>
-          <a:p>
-            <a:pPr lvl="1"/>
-            <a:r>
-              <a:rPr lang="en-US" dirty="0" smtClean="0"/>
-              <a:t>RF Data Rate 250 kbps</a:t>
-            </a:r>
-          </a:p>
-          <a:p>
-            <a:pPr lvl="1"/>
-            <a:r>
-              <a:rPr lang="en-US" dirty="0" smtClean="0"/>
-              <a:t>Serial Data Rate 1200 bps – 250 kbps</a:t>
-            </a:r>
-          </a:p>
-          <a:p>
-            <a:pPr lvl="1"/>
-            <a:r>
-              <a:rPr lang="en-US" dirty="0" err="1" smtClean="0"/>
-              <a:t>Xbee</a:t>
-            </a:r>
-            <a:r>
-              <a:rPr lang="en-US" dirty="0" smtClean="0"/>
-              <a:t> Explorer USB</a:t>
-            </a:r>
-          </a:p>
-          <a:p>
-            <a:pPr lvl="2"/>
-            <a:r>
-              <a:rPr lang="en-US" dirty="0" smtClean="0"/>
-              <a:t>Quick Development</a:t>
-            </a:r>
-          </a:p>
-          <a:p>
-            <a:pPr marL="64008" indent="0">
-              <a:buNone/>
-            </a:pPr>
-            <a:endParaRPr lang="en-US" dirty="0" smtClean="0"/>
-          </a:p>
-        </p:txBody>
-      </p:sp>
       <p:pic>
         <p:nvPicPr>
-          <p:cNvPr id="5" name="Picture 2"/>
+          <p:cNvPr id="1026" name="Picture 2" descr="D:\Documents\School\capstone\eyecu\flowcharts\mainsystem.wmf"/>
           <p:cNvPicPr>
             <a:picLocks noChangeAspect="1" noChangeArrowheads="1"/>
           </p:cNvPicPr>
@@ -12175,7 +12285,7 @@
           <a:blip r:embed="rId3" cstate="print">
             <a:extLst>
               <a:ext uri="{28A0092B-C50C-407E-A947-70E740481C1C}">
-                <a14:useLocalDpi xmlns:a14="http://schemas.microsoft.com/office/drawing/2010/main" xmlns="" val="0"/>
+                <a14:useLocalDpi xmlns:a14="http://schemas.microsoft.com/office/drawing/2010/main" val="0"/>
               </a:ext>
             </a:extLst>
           </a:blip>
@@ -12186,43 +12296,20 @@
         </p:blipFill>
         <p:spPr bwMode="auto">
           <a:xfrm>
-            <a:off x="6096000" y="4109854"/>
-            <a:ext cx="2905123" cy="2595746"/>
+            <a:off x="474403" y="1538204"/>
+            <a:ext cx="8440997" cy="4405396"/>
           </a:xfrm>
           <a:prstGeom prst="rect">
             <a:avLst/>
           </a:prstGeom>
           <a:noFill/>
-          <a:ln>
-            <a:noFill/>
-          </a:ln>
-          <a:effectLst/>
           <a:extLst>
             <a:ext uri="{909E8E84-426E-40DD-AFC4-6F175D3DCCD1}">
-              <a14:hiddenFill xmlns:a14="http://schemas.microsoft.com/office/drawing/2010/main" xmlns="">
+              <a14:hiddenFill xmlns:a14="http://schemas.microsoft.com/office/drawing/2010/main">
                 <a:solidFill>
-                  <a:schemeClr val="accent1"/>
+                  <a:srgbClr val="FFFFFF"/>
                 </a:solidFill>
               </a14:hiddenFill>
-            </a:ext>
-            <a:ext uri="{91240B29-F687-4F45-9708-019B960494DF}">
-              <a14:hiddenLine xmlns:a14="http://schemas.microsoft.com/office/drawing/2010/main" xmlns="" w="9525">
-                <a:solidFill>
-                  <a:schemeClr val="tx1"/>
-                </a:solidFill>
-                <a:miter lim="800000"/>
-                <a:headEnd/>
-                <a:tailEnd/>
-              </a14:hiddenLine>
-            </a:ext>
-            <a:ext uri="{AF507438-7753-43E0-B8FC-AC1667EBCBE1}">
-              <a14:hiddenEffects xmlns:a14="http://schemas.microsoft.com/office/drawing/2010/main" xmlns="">
-                <a:effectLst>
-                  <a:outerShdw dist="35921" dir="2700000" algn="ctr" rotWithShape="0">
-                    <a:schemeClr val="bg2"/>
-                  </a:outerShdw>
-                </a:effectLst>
-              </a14:hiddenEffects>
             </a:ext>
           </a:extLst>
         </p:spPr>
@@ -12230,7 +12317,7 @@
     </p:spTree>
     <p:extLst>
       <p:ext uri="{BB962C8B-B14F-4D97-AF65-F5344CB8AC3E}">
-        <p14:creationId xmlns:p14="http://schemas.microsoft.com/office/powerpoint/2010/main" xmlns="" val="1356230107"/>
+        <p14:creationId xmlns:p14="http://schemas.microsoft.com/office/powerpoint/2010/main" val="2295449146"/>
       </p:ext>
     </p:extLst>
   </p:cSld>
@@ -12274,22 +12361,16 @@
             <p:ph type="title"/>
           </p:nvPr>
         </p:nvSpPr>
-        <p:spPr>
-          <a:xfrm>
-            <a:off x="457200" y="0"/>
-            <a:ext cx="8229600" cy="1399032"/>
-          </a:xfrm>
-        </p:spPr>
+        <p:spPr/>
         <p:txBody>
           <a:bodyPr/>
           <a:lstStyle/>
           <a:p>
-            <a:pPr algn="ctr"/>
             <a:r>
               <a:rPr lang="en-US" dirty="0" smtClean="0">
                 <a:effectLst/>
               </a:rPr>
-              <a:t>Wireless Block Diagram</a:t>
+              <a:t>Camera</a:t>
             </a:r>
             <a:endParaRPr lang="en-US" dirty="0">
               <a:effectLst/>
@@ -12297,36 +12378,160 @@
           </a:p>
         </p:txBody>
       </p:sp>
+      <p:sp>
+        <p:nvSpPr>
+          <p:cNvPr id="3" name="Content Placeholder 2"/>
+          <p:cNvSpPr>
+            <a:spLocks noGrp="1"/>
+          </p:cNvSpPr>
+          <p:nvPr>
+            <p:ph idx="1"/>
+          </p:nvPr>
+        </p:nvSpPr>
+        <p:spPr>
+          <a:xfrm>
+            <a:off x="0" y="1600200"/>
+            <a:ext cx="8229600" cy="4572000"/>
+          </a:xfrm>
+        </p:spPr>
+        <p:txBody>
+          <a:bodyPr/>
+          <a:lstStyle/>
+          <a:p>
+            <a:r>
+              <a:rPr lang="en-US" dirty="0" smtClean="0"/>
+              <a:t>Used to record movements of the eye</a:t>
+            </a:r>
+          </a:p>
+          <a:p>
+            <a:r>
+              <a:rPr lang="en-US" dirty="0" smtClean="0"/>
+              <a:t>Tentative Camera</a:t>
+            </a:r>
+          </a:p>
+          <a:p>
+            <a:pPr lvl="1"/>
+            <a:r>
+              <a:rPr lang="en-US" dirty="0" smtClean="0"/>
+              <a:t>TCM8230MD CMOS Camera</a:t>
+            </a:r>
+          </a:p>
+          <a:p>
+            <a:pPr lvl="1"/>
+            <a:r>
+              <a:rPr lang="en-US" dirty="0" smtClean="0"/>
+              <a:t>Small, ideal for a wearable device</a:t>
+            </a:r>
+          </a:p>
+          <a:p>
+            <a:pPr lvl="1"/>
+            <a:r>
+              <a:rPr lang="en-US" dirty="0" smtClean="0"/>
+              <a:t>640 x 480 Pixel Resolution (VGA)</a:t>
+            </a:r>
+          </a:p>
+          <a:p>
+            <a:pPr lvl="1"/>
+            <a:r>
+              <a:rPr lang="en-US" dirty="0" smtClean="0"/>
+              <a:t>30 FPS (Frames </a:t>
+            </a:r>
+            <a:r>
+              <a:rPr lang="en-US" dirty="0"/>
+              <a:t>P</a:t>
+            </a:r>
+            <a:r>
+              <a:rPr lang="en-US" dirty="0" smtClean="0"/>
+              <a:t>er Second)</a:t>
+            </a:r>
+          </a:p>
+          <a:p>
+            <a:pPr lvl="1"/>
+            <a:r>
+              <a:rPr lang="en-US" dirty="0" smtClean="0"/>
+              <a:t>Command I/O 12C</a:t>
+            </a:r>
+          </a:p>
+          <a:p>
+            <a:pPr lvl="1"/>
+            <a:r>
+              <a:rPr lang="en-US" dirty="0" smtClean="0"/>
+              <a:t>Data Output 8-bit Parallel (YUV or RGB)</a:t>
+            </a:r>
+          </a:p>
+          <a:p>
+            <a:pPr lvl="1"/>
+            <a:r>
+              <a:rPr lang="en-US" dirty="0" smtClean="0"/>
+              <a:t>Data Output Rate 144kbps</a:t>
+            </a:r>
+            <a:endParaRPr lang="en-US" dirty="0"/>
+          </a:p>
+          <a:p>
+            <a:endParaRPr lang="en-US" dirty="0" smtClean="0"/>
+          </a:p>
+        </p:txBody>
+      </p:sp>
       <p:pic>
         <p:nvPicPr>
-          <p:cNvPr id="7170" name="Picture 2" descr="C:\Users\Khashi\Desktop\wireless.wmf"/>
+          <p:cNvPr id="4" name="Picture 2"/>
           <p:cNvPicPr>
             <a:picLocks noChangeAspect="1" noChangeArrowheads="1"/>
           </p:cNvPicPr>
           <p:nvPr/>
         </p:nvPicPr>
         <p:blipFill>
-          <a:blip r:embed="rId3" cstate="print"/>
+          <a:blip r:embed="rId3" cstate="print">
+            <a:extLst>
+              <a:ext uri="{28A0092B-C50C-407E-A947-70E740481C1C}">
+                <a14:useLocalDpi xmlns:a14="http://schemas.microsoft.com/office/drawing/2010/main" val="0"/>
+              </a:ext>
+            </a:extLst>
+          </a:blip>
+          <a:srcRect/>
           <a:stretch>
             <a:fillRect/>
           </a:stretch>
         </p:blipFill>
         <p:spPr bwMode="auto">
           <a:xfrm>
-            <a:off x="81133" y="1981200"/>
-            <a:ext cx="8986666" cy="3392719"/>
+            <a:off x="5638800" y="2286000"/>
+            <a:ext cx="3310013" cy="2590800"/>
           </a:xfrm>
           <a:prstGeom prst="rect">
             <a:avLst/>
           </a:prstGeom>
           <a:noFill/>
+          <a:ln>
+            <a:noFill/>
+          </a:ln>
+          <a:effectLst/>
           <a:extLst>
             <a:ext uri="{909E8E84-426E-40DD-AFC4-6F175D3DCCD1}">
-              <a14:hiddenFill xmlns:a14="http://schemas.microsoft.com/office/drawing/2010/main" xmlns="">
+              <a14:hiddenFill xmlns:a14="http://schemas.microsoft.com/office/drawing/2010/main">
                 <a:solidFill>
-                  <a:srgbClr val="FFFFFF"/>
+                  <a:schemeClr val="accent1"/>
                 </a:solidFill>
               </a14:hiddenFill>
+            </a:ext>
+            <a:ext uri="{91240B29-F687-4F45-9708-019B960494DF}">
+              <a14:hiddenLine xmlns:a14="http://schemas.microsoft.com/office/drawing/2010/main" w="9525">
+                <a:solidFill>
+                  <a:schemeClr val="tx1"/>
+                </a:solidFill>
+                <a:miter lim="800000"/>
+                <a:headEnd/>
+                <a:tailEnd/>
+              </a14:hiddenLine>
+            </a:ext>
+            <a:ext uri="{AF507438-7753-43E0-B8FC-AC1667EBCBE1}">
+              <a14:hiddenEffects xmlns:a14="http://schemas.microsoft.com/office/drawing/2010/main">
+                <a:effectLst>
+                  <a:outerShdw dist="35921" dir="2700000" algn="ctr" rotWithShape="0">
+                    <a:schemeClr val="bg2"/>
+                  </a:outerShdw>
+                </a:effectLst>
+              </a14:hiddenEffects>
             </a:ext>
           </a:extLst>
         </p:spPr>
@@ -12334,7 +12539,7 @@
     </p:spTree>
     <p:extLst>
       <p:ext uri="{BB962C8B-B14F-4D97-AF65-F5344CB8AC3E}">
-        <p14:creationId xmlns:p14="http://schemas.microsoft.com/office/powerpoint/2010/main" xmlns="" val="1543945623"/>
+        <p14:creationId xmlns:p14="http://schemas.microsoft.com/office/powerpoint/2010/main" val="247184147"/>
       </p:ext>
     </p:extLst>
   </p:cSld>
@@ -12387,7 +12592,7 @@
               <a:rPr lang="en-US" dirty="0" smtClean="0">
                 <a:effectLst/>
               </a:rPr>
-              <a:t>Risk</a:t>
+              <a:t>Camera</a:t>
             </a:r>
             <a:endParaRPr lang="en-US" dirty="0">
               <a:effectLst/>
@@ -12407,33 +12612,122 @@
         </p:nvSpPr>
         <p:spPr>
           <a:xfrm>
-            <a:off x="457200" y="1600200"/>
+            <a:off x="0" y="1600200"/>
             <a:ext cx="8229600" cy="4572000"/>
           </a:xfrm>
         </p:spPr>
         <p:txBody>
           <a:bodyPr>
-            <a:normAutofit/>
+            <a:normAutofit fontScale="92500" lnSpcReduction="10000"/>
           </a:bodyPr>
           <a:lstStyle/>
           <a:p>
             <a:r>
               <a:rPr lang="en-US" dirty="0" smtClean="0"/>
-              <a:t>RF Exposure (Time and Distance)</a:t>
+              <a:t>Controlled across </a:t>
+            </a:r>
+            <a:r>
+              <a:rPr lang="en-US" dirty="0" smtClean="0"/>
+              <a:t>I2C </a:t>
+            </a:r>
+            <a:r>
+              <a:rPr lang="en-US" dirty="0" smtClean="0"/>
+              <a:t>(</a:t>
+            </a:r>
+            <a:r>
+              <a:rPr lang="en-US" dirty="0" err="1" smtClean="0"/>
+              <a:t>uC</a:t>
+            </a:r>
+            <a:r>
+              <a:rPr lang="en-US" dirty="0" smtClean="0"/>
+              <a:t> GPIO)</a:t>
+            </a:r>
+          </a:p>
+          <a:p>
+            <a:r>
+              <a:rPr lang="en-US" dirty="0" smtClean="0"/>
+              <a:t>Synchronization</a:t>
+            </a:r>
+          </a:p>
+          <a:p>
+            <a:r>
+              <a:rPr lang="en-US" dirty="0" smtClean="0"/>
+              <a:t>Data Output 8-bit</a:t>
             </a:r>
           </a:p>
           <a:p>
             <a:pPr lvl="1"/>
             <a:r>
               <a:rPr lang="en-US" dirty="0" smtClean="0"/>
-              <a:t>1mW Wireless</a:t>
-            </a:r>
+              <a:t>Buffer</a:t>
+            </a:r>
+          </a:p>
+          <a:p>
+            <a:pPr lvl="1"/>
+            <a:r>
+              <a:rPr lang="en-US" dirty="0" smtClean="0"/>
+              <a:t>Hardware Solution</a:t>
+            </a:r>
+          </a:p>
+          <a:p>
+            <a:pPr lvl="2"/>
+            <a:r>
+              <a:rPr lang="en-US" dirty="0" smtClean="0"/>
+              <a:t>Shift Registers -&gt; Serial</a:t>
+            </a:r>
+          </a:p>
+          <a:p>
+            <a:pPr lvl="2"/>
+            <a:r>
+              <a:rPr lang="en-US" dirty="0" smtClean="0"/>
+              <a:t>Latch -&gt; Storage Management</a:t>
+            </a:r>
+          </a:p>
+          <a:p>
+            <a:pPr lvl="2"/>
+            <a:r>
+              <a:rPr lang="en-US" dirty="0" smtClean="0"/>
+              <a:t>Read from buffer into </a:t>
+            </a:r>
+            <a:r>
+              <a:rPr lang="en-US" dirty="0" err="1" smtClean="0"/>
+              <a:t>uC</a:t>
+            </a:r>
+            <a:endParaRPr lang="en-US" dirty="0" smtClean="0"/>
+          </a:p>
+          <a:p>
+            <a:pPr lvl="1"/>
+            <a:r>
+              <a:rPr lang="en-US" dirty="0" smtClean="0"/>
+              <a:t>Additional Microcontroller Solution</a:t>
+            </a:r>
+          </a:p>
+          <a:p>
+            <a:pPr lvl="2"/>
+            <a:r>
+              <a:rPr lang="en-US" dirty="0" smtClean="0"/>
+              <a:t>Use </a:t>
+            </a:r>
+            <a:r>
+              <a:rPr lang="en-US" dirty="0" err="1" smtClean="0"/>
+              <a:t>uC</a:t>
+            </a:r>
+            <a:r>
+              <a:rPr lang="en-US" dirty="0" smtClean="0"/>
+              <a:t> to provide 8-bit Parallel Interface with other synchronization signals and command</a:t>
+            </a:r>
+          </a:p>
+          <a:p>
+            <a:pPr marL="64008" indent="0">
+              <a:buNone/>
+            </a:pPr>
+            <a:endParaRPr lang="en-US" dirty="0" smtClean="0"/>
           </a:p>
         </p:txBody>
       </p:sp>
       <p:pic>
         <p:nvPicPr>
-          <p:cNvPr id="5" name="Picture 2"/>
+          <p:cNvPr id="4" name="Picture 2"/>
           <p:cNvPicPr>
             <a:picLocks noChangeAspect="1" noChangeArrowheads="1"/>
           </p:cNvPicPr>
@@ -12443,7 +12737,7 @@
           <a:blip r:embed="rId3" cstate="print">
             <a:extLst>
               <a:ext uri="{28A0092B-C50C-407E-A947-70E740481C1C}">
-                <a14:useLocalDpi xmlns:a14="http://schemas.microsoft.com/office/drawing/2010/main" xmlns="" val="0"/>
+                <a14:useLocalDpi xmlns:a14="http://schemas.microsoft.com/office/drawing/2010/main" val="0"/>
               </a:ext>
             </a:extLst>
           </a:blip>
@@ -12454,8 +12748,8 @@
         </p:blipFill>
         <p:spPr bwMode="auto">
           <a:xfrm>
-            <a:off x="6019800" y="4114800"/>
-            <a:ext cx="2905123" cy="2595746"/>
+            <a:off x="5638800" y="2286000"/>
+            <a:ext cx="3310013" cy="2590800"/>
           </a:xfrm>
           <a:prstGeom prst="rect">
             <a:avLst/>
@@ -12467,14 +12761,14 @@
           <a:effectLst/>
           <a:extLst>
             <a:ext uri="{909E8E84-426E-40DD-AFC4-6F175D3DCCD1}">
-              <a14:hiddenFill xmlns:a14="http://schemas.microsoft.com/office/drawing/2010/main" xmlns="">
+              <a14:hiddenFill xmlns:a14="http://schemas.microsoft.com/office/drawing/2010/main">
                 <a:solidFill>
                   <a:schemeClr val="accent1"/>
                 </a:solidFill>
               </a14:hiddenFill>
             </a:ext>
             <a:ext uri="{91240B29-F687-4F45-9708-019B960494DF}">
-              <a14:hiddenLine xmlns:a14="http://schemas.microsoft.com/office/drawing/2010/main" xmlns="" w="9525">
+              <a14:hiddenLine xmlns:a14="http://schemas.microsoft.com/office/drawing/2010/main" w="9525">
                 <a:solidFill>
                   <a:schemeClr val="tx1"/>
                 </a:solidFill>
@@ -12484,7 +12778,7 @@
               </a14:hiddenLine>
             </a:ext>
             <a:ext uri="{AF507438-7753-43E0-B8FC-AC1667EBCBE1}">
-              <a14:hiddenEffects xmlns:a14="http://schemas.microsoft.com/office/drawing/2010/main" xmlns="">
+              <a14:hiddenEffects xmlns:a14="http://schemas.microsoft.com/office/drawing/2010/main">
                 <a:effectLst>
                   <a:outerShdw dist="35921" dir="2700000" algn="ctr" rotWithShape="0">
                     <a:schemeClr val="bg2"/>
@@ -12498,7 +12792,7 @@
     </p:spTree>
     <p:extLst>
       <p:ext uri="{BB962C8B-B14F-4D97-AF65-F5344CB8AC3E}">
-        <p14:creationId xmlns:p14="http://schemas.microsoft.com/office/powerpoint/2010/main" xmlns="" val="326014201"/>
+        <p14:creationId xmlns:p14="http://schemas.microsoft.com/office/powerpoint/2010/main" val="3764113509"/>
       </p:ext>
     </p:extLst>
   </p:cSld>
@@ -12516,6 +12810,110 @@
 </file>
 
 <file path=ppt/slides/slide36.xml><?xml version="1.0" encoding="utf-8"?>
+<p:sld xmlns:a="http://schemas.openxmlformats.org/drawingml/2006/main" xmlns:r="http://schemas.openxmlformats.org/officeDocument/2006/relationships" xmlns:p="http://schemas.openxmlformats.org/presentationml/2006/main">
+  <p:cSld>
+    <p:spTree>
+      <p:nvGrpSpPr>
+        <p:cNvPr id="1" name=""/>
+        <p:cNvGrpSpPr/>
+        <p:nvPr/>
+      </p:nvGrpSpPr>
+      <p:grpSpPr>
+        <a:xfrm>
+          <a:off x="0" y="0"/>
+          <a:ext cx="0" cy="0"/>
+          <a:chOff x="0" y="0"/>
+          <a:chExt cx="0" cy="0"/>
+        </a:xfrm>
+      </p:grpSpPr>
+      <p:sp>
+        <p:nvSpPr>
+          <p:cNvPr id="2" name="Title 1"/>
+          <p:cNvSpPr>
+            <a:spLocks noGrp="1"/>
+          </p:cNvSpPr>
+          <p:nvPr>
+            <p:ph type="title"/>
+          </p:nvPr>
+        </p:nvSpPr>
+        <p:spPr>
+          <a:xfrm>
+            <a:off x="457200" y="-304800"/>
+            <a:ext cx="8229600" cy="1399032"/>
+          </a:xfrm>
+        </p:spPr>
+        <p:txBody>
+          <a:bodyPr/>
+          <a:lstStyle/>
+          <a:p>
+            <a:pPr algn="ctr"/>
+            <a:r>
+              <a:rPr lang="en-US" dirty="0" smtClean="0">
+                <a:effectLst/>
+              </a:rPr>
+              <a:t>Camera Block Diagram</a:t>
+            </a:r>
+            <a:endParaRPr lang="en-US" dirty="0">
+              <a:effectLst/>
+            </a:endParaRPr>
+          </a:p>
+        </p:txBody>
+      </p:sp>
+      <p:pic>
+        <p:nvPicPr>
+          <p:cNvPr id="3077" name="Picture 5" descr="C:\Users\Khashi\Desktop\cameraboard (1).wmf"/>
+          <p:cNvPicPr>
+            <a:picLocks noChangeAspect="1" noChangeArrowheads="1"/>
+          </p:cNvPicPr>
+          <p:nvPr/>
+        </p:nvPicPr>
+        <p:blipFill>
+          <a:blip r:embed="rId3" cstate="print"/>
+          <a:stretch>
+            <a:fillRect/>
+          </a:stretch>
+        </p:blipFill>
+        <p:spPr bwMode="auto">
+          <a:xfrm>
+            <a:off x="1195699" y="762001"/>
+            <a:ext cx="6697951" cy="6087414"/>
+          </a:xfrm>
+          <a:prstGeom prst="rect">
+            <a:avLst/>
+          </a:prstGeom>
+          <a:noFill/>
+          <a:extLst>
+            <a:ext uri="{909E8E84-426E-40DD-AFC4-6F175D3DCCD1}">
+              <a14:hiddenFill xmlns:a14="http://schemas.microsoft.com/office/drawing/2010/main">
+                <a:solidFill>
+                  <a:srgbClr val="FFFFFF"/>
+                </a:solidFill>
+              </a14:hiddenFill>
+            </a:ext>
+          </a:extLst>
+        </p:spPr>
+      </p:pic>
+    </p:spTree>
+    <p:extLst>
+      <p:ext uri="{BB962C8B-B14F-4D97-AF65-F5344CB8AC3E}">
+        <p14:creationId xmlns:p14="http://schemas.microsoft.com/office/powerpoint/2010/main" val="1436569290"/>
+      </p:ext>
+    </p:extLst>
+  </p:cSld>
+  <p:clrMapOvr>
+    <a:masterClrMapping/>
+  </p:clrMapOvr>
+  <p:timing>
+    <p:tnLst>
+      <p:par>
+        <p:cTn id="1" dur="indefinite" restart="never" nodeType="tmRoot"/>
+      </p:par>
+    </p:tnLst>
+  </p:timing>
+</p:sld>
+</file>
+
+<file path=ppt/slides/slide37.xml><?xml version="1.0" encoding="utf-8"?>
 <p:sld xmlns:a="http://schemas.openxmlformats.org/drawingml/2006/main" xmlns:r="http://schemas.openxmlformats.org/officeDocument/2006/relationships" xmlns:p="http://schemas.openxmlformats.org/presentationml/2006/main">
   <p:cSld>
     <p:spTree>
@@ -13444,11 +13842,7 @@
                       </a:r>
                       <a:r>
                         <a:rPr lang="en-US" sz="1600" u="none" strike="noStrike" dirty="0" smtClean="0"/>
-                        <a:t> Microcontroller </a:t>
-                      </a:r>
-                      <a:r>
-                        <a:rPr lang="en-US" sz="1600" u="none" strike="noStrike" dirty="0" smtClean="0"/>
-                        <a:t>(ARM)</a:t>
+                        <a:t> Microcontroller (ARM)</a:t>
                       </a:r>
                       <a:endParaRPr lang="en-US" sz="1600" b="0" i="0" u="none" strike="noStrike" dirty="0">
                         <a:solidFill>
@@ -14980,7 +15374,7 @@
     </p:spTree>
     <p:extLst>
       <p:ext uri="{BB962C8B-B14F-4D97-AF65-F5344CB8AC3E}">
-        <p14:creationId xmlns:p14="http://schemas.microsoft.com/office/powerpoint/2010/main" xmlns="" val="1047977503"/>
+        <p14:creationId xmlns:p14="http://schemas.microsoft.com/office/powerpoint/2010/main" val="1047977503"/>
       </p:ext>
     </p:extLst>
   </p:cSld>
@@ -14997,7 +15391,7 @@
 </p:sld>
 </file>
 
-<file path=ppt/slides/slide37.xml><?xml version="1.0" encoding="utf-8"?>
+<file path=ppt/slides/slide38.xml><?xml version="1.0" encoding="utf-8"?>
 <p:sld xmlns:a="http://schemas.openxmlformats.org/drawingml/2006/main" xmlns:r="http://schemas.openxmlformats.org/officeDocument/2006/relationships" xmlns:p="http://schemas.openxmlformats.org/presentationml/2006/main">
   <p:cSld>
     <p:spTree>
@@ -15024,6 +15418,82 @@
             <p:ph type="title"/>
           </p:nvPr>
         </p:nvSpPr>
+        <p:spPr/>
+        <p:txBody>
+          <a:bodyPr/>
+          <a:lstStyle/>
+          <a:p>
+            <a:r>
+              <a:rPr lang="en-US" dirty="0" smtClean="0"/>
+              <a:t>Sustainability and Environmental Concerns</a:t>
+            </a:r>
+            <a:endParaRPr lang="en-US" dirty="0"/>
+          </a:p>
+        </p:txBody>
+      </p:sp>
+      <p:sp>
+        <p:nvSpPr>
+          <p:cNvPr id="3" name="Content Placeholder 2"/>
+          <p:cNvSpPr>
+            <a:spLocks noGrp="1"/>
+          </p:cNvSpPr>
+          <p:nvPr>
+            <p:ph idx="1"/>
+          </p:nvPr>
+        </p:nvSpPr>
+        <p:spPr/>
+        <p:txBody>
+          <a:bodyPr/>
+          <a:lstStyle/>
+          <a:p>
+            <a:r>
+              <a:rPr lang="en-US" smtClean="0"/>
+              <a:t>RoHS</a:t>
+            </a:r>
+            <a:endParaRPr lang="en-US"/>
+          </a:p>
+        </p:txBody>
+      </p:sp>
+    </p:spTree>
+    <p:extLst>
+      <p:ext uri="{BB962C8B-B14F-4D97-AF65-F5344CB8AC3E}">
+        <p14:creationId xmlns:p14="http://schemas.microsoft.com/office/powerpoint/2010/main" val="1789122859"/>
+      </p:ext>
+    </p:extLst>
+  </p:cSld>
+  <p:clrMapOvr>
+    <a:masterClrMapping/>
+  </p:clrMapOvr>
+</p:sld>
+</file>
+
+<file path=ppt/slides/slide39.xml><?xml version="1.0" encoding="utf-8"?>
+<p:sld xmlns:a="http://schemas.openxmlformats.org/drawingml/2006/main" xmlns:r="http://schemas.openxmlformats.org/officeDocument/2006/relationships" xmlns:p="http://schemas.openxmlformats.org/presentationml/2006/main">
+  <p:cSld>
+    <p:spTree>
+      <p:nvGrpSpPr>
+        <p:cNvPr id="1" name=""/>
+        <p:cNvGrpSpPr/>
+        <p:nvPr/>
+      </p:nvGrpSpPr>
+      <p:grpSpPr>
+        <a:xfrm>
+          <a:off x="0" y="0"/>
+          <a:ext cx="0" cy="0"/>
+          <a:chOff x="0" y="0"/>
+          <a:chExt cx="0" cy="0"/>
+        </a:xfrm>
+      </p:grpSpPr>
+      <p:sp>
+        <p:nvSpPr>
+          <p:cNvPr id="2" name="Title 1"/>
+          <p:cNvSpPr>
+            <a:spLocks noGrp="1"/>
+          </p:cNvSpPr>
+          <p:nvPr>
+            <p:ph type="title"/>
+          </p:nvPr>
+        </p:nvSpPr>
         <p:spPr>
           <a:xfrm>
             <a:off x="457200" y="0"/>
@@ -15058,7 +15528,7 @@
             <p:ph idx="1"/>
             <p:extLst>
               <p:ext uri="{D42A27DB-BD31-4B8C-83A1-F6EECF244321}">
-                <p14:modId xmlns:p14="http://schemas.microsoft.com/office/powerpoint/2010/main" xmlns="" val="2897383790"/>
+                <p14:modId xmlns:p14="http://schemas.microsoft.com/office/powerpoint/2010/main" val="2897383790"/>
               </p:ext>
             </p:extLst>
           </p:nvPr>
@@ -16995,7 +17465,7 @@
           <a:blip r:embed="rId3" cstate="print">
             <a:extLst>
               <a:ext uri="{28A0092B-C50C-407E-A947-70E740481C1C}">
-                <a14:useLocalDpi xmlns:a14="http://schemas.microsoft.com/office/drawing/2010/main" xmlns="" val="0"/>
+                <a14:useLocalDpi xmlns:a14="http://schemas.microsoft.com/office/drawing/2010/main" val="0"/>
               </a:ext>
             </a:extLst>
           </a:blip>
@@ -17019,14 +17489,14 @@
           <a:effectLst/>
           <a:extLst>
             <a:ext uri="{909E8E84-426E-40DD-AFC4-6F175D3DCCD1}">
-              <a14:hiddenFill xmlns:a14="http://schemas.microsoft.com/office/drawing/2010/main" xmlns="">
+              <a14:hiddenFill xmlns:a14="http://schemas.microsoft.com/office/drawing/2010/main">
                 <a:solidFill>
                   <a:schemeClr val="accent1"/>
                 </a:solidFill>
               </a14:hiddenFill>
             </a:ext>
             <a:ext uri="{91240B29-F687-4F45-9708-019B960494DF}">
-              <a14:hiddenLine xmlns:a14="http://schemas.microsoft.com/office/drawing/2010/main" xmlns="" w="9525">
+              <a14:hiddenLine xmlns:a14="http://schemas.microsoft.com/office/drawing/2010/main" w="9525">
                 <a:solidFill>
                   <a:schemeClr val="tx1"/>
                 </a:solidFill>
@@ -17036,7 +17506,7 @@
               </a14:hiddenLine>
             </a:ext>
             <a:ext uri="{AF507438-7753-43E0-B8FC-AC1667EBCBE1}">
-              <a14:hiddenEffects xmlns:a14="http://schemas.microsoft.com/office/drawing/2010/main" xmlns="">
+              <a14:hiddenEffects xmlns:a14="http://schemas.microsoft.com/office/drawing/2010/main">
                 <a:effectLst>
                   <a:outerShdw dist="35921" dir="2700000" algn="ctr" rotWithShape="0">
                     <a:schemeClr val="bg2"/>
@@ -17059,7 +17529,7 @@
           <a:blip r:embed="rId4" cstate="print">
             <a:extLst>
               <a:ext uri="{28A0092B-C50C-407E-A947-70E740481C1C}">
-                <a14:useLocalDpi xmlns:a14="http://schemas.microsoft.com/office/drawing/2010/main" xmlns="" val="0"/>
+                <a14:useLocalDpi xmlns:a14="http://schemas.microsoft.com/office/drawing/2010/main" val="0"/>
               </a:ext>
             </a:extLst>
           </a:blip>
@@ -17083,14 +17553,14 @@
           <a:effectLst/>
           <a:extLst>
             <a:ext uri="{909E8E84-426E-40DD-AFC4-6F175D3DCCD1}">
-              <a14:hiddenFill xmlns:a14="http://schemas.microsoft.com/office/drawing/2010/main" xmlns="">
+              <a14:hiddenFill xmlns:a14="http://schemas.microsoft.com/office/drawing/2010/main">
                 <a:solidFill>
                   <a:schemeClr val="accent1"/>
                 </a:solidFill>
               </a14:hiddenFill>
             </a:ext>
             <a:ext uri="{91240B29-F687-4F45-9708-019B960494DF}">
-              <a14:hiddenLine xmlns:a14="http://schemas.microsoft.com/office/drawing/2010/main" xmlns="" w="9525">
+              <a14:hiddenLine xmlns:a14="http://schemas.microsoft.com/office/drawing/2010/main" w="9525">
                 <a:solidFill>
                   <a:schemeClr val="tx1"/>
                 </a:solidFill>
@@ -17100,7 +17570,7 @@
               </a14:hiddenLine>
             </a:ext>
             <a:ext uri="{AF507438-7753-43E0-B8FC-AC1667EBCBE1}">
-              <a14:hiddenEffects xmlns:a14="http://schemas.microsoft.com/office/drawing/2010/main" xmlns="">
+              <a14:hiddenEffects xmlns:a14="http://schemas.microsoft.com/office/drawing/2010/main">
                 <a:effectLst>
                   <a:outerShdw dist="35921" dir="2700000" algn="ctr" rotWithShape="0">
                     <a:schemeClr val="bg2"/>
@@ -17361,7 +17831,7 @@
     </p:spTree>
     <p:extLst>
       <p:ext uri="{BB962C8B-B14F-4D97-AF65-F5344CB8AC3E}">
-        <p14:creationId xmlns:p14="http://schemas.microsoft.com/office/powerpoint/2010/main" xmlns="" val="3143564609"/>
+        <p14:creationId xmlns:p14="http://schemas.microsoft.com/office/powerpoint/2010/main" val="3143564609"/>
       </p:ext>
     </p:extLst>
   </p:cSld>
@@ -17375,6 +17845,82 @@
       </p:par>
     </p:tnLst>
   </p:timing>
+</p:sld>
+</file>
+
+<file path=ppt/slides/slide40.xml><?xml version="1.0" encoding="utf-8"?>
+<p:sld xmlns:a="http://schemas.openxmlformats.org/drawingml/2006/main" xmlns:r="http://schemas.openxmlformats.org/officeDocument/2006/relationships" xmlns:p="http://schemas.openxmlformats.org/presentationml/2006/main">
+  <p:cSld>
+    <p:spTree>
+      <p:nvGrpSpPr>
+        <p:cNvPr id="1" name=""/>
+        <p:cNvGrpSpPr/>
+        <p:nvPr/>
+      </p:nvGrpSpPr>
+      <p:grpSpPr>
+        <a:xfrm>
+          <a:off x="0" y="0"/>
+          <a:ext cx="0" cy="0"/>
+          <a:chOff x="0" y="0"/>
+          <a:chExt cx="0" cy="0"/>
+        </a:xfrm>
+      </p:grpSpPr>
+      <p:sp>
+        <p:nvSpPr>
+          <p:cNvPr id="2" name="Title 1"/>
+          <p:cNvSpPr>
+            <a:spLocks noGrp="1"/>
+          </p:cNvSpPr>
+          <p:nvPr>
+            <p:ph type="title"/>
+          </p:nvPr>
+        </p:nvSpPr>
+        <p:spPr>
+          <a:xfrm>
+            <a:off x="457200" y="267494"/>
+            <a:ext cx="8229600" cy="4761706"/>
+          </a:xfrm>
+        </p:spPr>
+        <p:txBody>
+          <a:bodyPr/>
+          <a:lstStyle/>
+          <a:p>
+            <a:pPr algn="ctr"/>
+            <a:r>
+              <a:rPr lang="en-US" dirty="0" smtClean="0">
+                <a:effectLst/>
+              </a:rPr>
+              <a:t/>
+            </a:r>
+            <a:br>
+              <a:rPr lang="en-US" dirty="0" smtClean="0">
+                <a:effectLst/>
+              </a:rPr>
+            </a:br>
+            <a:r>
+              <a:rPr lang="en-US" dirty="0" smtClean="0">
+                <a:effectLst/>
+              </a:rPr>
+              <a:t>Questions</a:t>
+            </a:r>
+            <a:r>
+              <a:rPr lang="en-US" dirty="0" smtClean="0"/>
+              <a:t>?</a:t>
+            </a:r>
+            <a:endParaRPr lang="en-US" dirty="0"/>
+          </a:p>
+        </p:txBody>
+      </p:sp>
+    </p:spTree>
+    <p:extLst>
+      <p:ext uri="{BB962C8B-B14F-4D97-AF65-F5344CB8AC3E}">
+        <p14:creationId xmlns:p14="http://schemas.microsoft.com/office/powerpoint/2010/main" val="3053473557"/>
+      </p:ext>
+    </p:extLst>
+  </p:cSld>
+  <p:clrMapOvr>
+    <a:masterClrMapping/>
+  </p:clrMapOvr>
 </p:sld>
 </file>
 
@@ -17553,7 +18099,7 @@
     </p:spTree>
     <p:extLst>
       <p:ext uri="{BB962C8B-B14F-4D97-AF65-F5344CB8AC3E}">
-        <p14:creationId xmlns:p14="http://schemas.microsoft.com/office/powerpoint/2010/main" xmlns="" val="1400509678"/>
+        <p14:creationId xmlns:p14="http://schemas.microsoft.com/office/powerpoint/2010/main" val="1400509678"/>
       </p:ext>
     </p:extLst>
   </p:cSld>
@@ -17632,7 +18178,7 @@
           <a:blip r:embed="rId3" cstate="print">
             <a:extLst>
               <a:ext uri="{28A0092B-C50C-407E-A947-70E740481C1C}">
-                <a14:useLocalDpi xmlns:a14="http://schemas.microsoft.com/office/drawing/2010/main" xmlns="" val="0"/>
+                <a14:useLocalDpi xmlns:a14="http://schemas.microsoft.com/office/drawing/2010/main" val="0"/>
               </a:ext>
             </a:extLst>
           </a:blip>
@@ -17652,7 +18198,7 @@
           <a:noFill/>
           <a:extLst>
             <a:ext uri="{909E8E84-426E-40DD-AFC4-6F175D3DCCD1}">
-              <a14:hiddenFill xmlns:a14="http://schemas.microsoft.com/office/drawing/2010/main" xmlns="">
+              <a14:hiddenFill xmlns:a14="http://schemas.microsoft.com/office/drawing/2010/main">
                 <a:solidFill>
                   <a:srgbClr val="FFFFFF"/>
                 </a:solidFill>
@@ -17664,7 +18210,7 @@
     </p:spTree>
     <p:extLst>
       <p:ext uri="{BB962C8B-B14F-4D97-AF65-F5344CB8AC3E}">
-        <p14:creationId xmlns:p14="http://schemas.microsoft.com/office/powerpoint/2010/main" xmlns="" val="3662926366"/>
+        <p14:creationId xmlns:p14="http://schemas.microsoft.com/office/powerpoint/2010/main" val="3662926366"/>
       </p:ext>
     </p:extLst>
   </p:cSld>
@@ -17723,13 +18269,7 @@
               <a:rPr lang="en-US" dirty="0" smtClean="0">
                 <a:effectLst/>
               </a:rPr>
-              <a:t>DSP </a:t>
-            </a:r>
-            <a:r>
-              <a:rPr lang="en-US" dirty="0" smtClean="0">
-                <a:effectLst/>
-              </a:rPr>
-              <a:t>Software Flow</a:t>
+              <a:t>DSP Software Flow</a:t>
             </a:r>
             <a:endParaRPr lang="en-US" dirty="0">
               <a:effectLst/>
@@ -17762,7 +18302,7 @@
           <a:noFill/>
           <a:extLst>
             <a:ext uri="{909E8E84-426E-40DD-AFC4-6F175D3DCCD1}">
-              <a14:hiddenFill xmlns:a14="http://schemas.microsoft.com/office/drawing/2010/main" xmlns="">
+              <a14:hiddenFill xmlns:a14="http://schemas.microsoft.com/office/drawing/2010/main">
                 <a:solidFill>
                   <a:srgbClr val="FFFFFF"/>
                 </a:solidFill>
@@ -17861,7 +18401,7 @@
           <a:noFill/>
           <a:extLst>
             <a:ext uri="{909E8E84-426E-40DD-AFC4-6F175D3DCCD1}">
-              <a14:hiddenFill xmlns:a14="http://schemas.microsoft.com/office/drawing/2010/main" xmlns="">
+              <a14:hiddenFill xmlns:a14="http://schemas.microsoft.com/office/drawing/2010/main">
                 <a:solidFill>
                   <a:srgbClr val="FFFFFF"/>
                 </a:solidFill>
@@ -17873,7 +18413,7 @@
     </p:spTree>
     <p:extLst>
       <p:ext uri="{BB962C8B-B14F-4D97-AF65-F5344CB8AC3E}">
-        <p14:creationId xmlns:p14="http://schemas.microsoft.com/office/powerpoint/2010/main" xmlns="" val="3921188572"/>
+        <p14:creationId xmlns:p14="http://schemas.microsoft.com/office/powerpoint/2010/main" val="3921188572"/>
       </p:ext>
     </p:extLst>
   </p:cSld>
@@ -18026,7 +18566,7 @@
           <a:noFill/>
           <a:extLst>
             <a:ext uri="{909E8E84-426E-40DD-AFC4-6F175D3DCCD1}">
-              <a14:hiddenFill xmlns:a14="http://schemas.microsoft.com/office/drawing/2010/main" xmlns="">
+              <a14:hiddenFill xmlns:a14="http://schemas.microsoft.com/office/drawing/2010/main">
                 <a:solidFill>
                   <a:srgbClr val="FFFFFF"/>
                 </a:solidFill>
@@ -18038,7 +18578,7 @@
     </p:spTree>
     <p:extLst>
       <p:ext uri="{BB962C8B-B14F-4D97-AF65-F5344CB8AC3E}">
-        <p14:creationId xmlns:p14="http://schemas.microsoft.com/office/powerpoint/2010/main" xmlns="" val="781549472"/>
+        <p14:creationId xmlns:p14="http://schemas.microsoft.com/office/powerpoint/2010/main" val="781549472"/>
       </p:ext>
     </p:extLst>
   </p:cSld>

</xml_diff>

<commit_message>
Added notes to my slides on the PDR
</commit_message>
<xml_diff>
--- a/PDR/PDR.pptx
+++ b/PDR/PDR.pptx
@@ -232,7 +232,7 @@
             <a:fld id="{C78564CF-C1E2-4A3A-8461-DA418FAA27FF}" type="datetimeFigureOut">
               <a:rPr lang="en-US" smtClean="0"/>
               <a:pPr/>
-              <a:t>1/29/2012</a:t>
+              <a:t>1/30/2012</a:t>
             </a:fld>
             <a:endParaRPr lang="en-US"/>
           </a:p>
@@ -745,7 +745,6 @@
               <a:rPr lang="en-US" dirty="0" smtClean="0"/>
               <a:t>Nick</a:t>
             </a:r>
-            <a:endParaRPr lang="en-US" dirty="0" smtClean="0"/>
           </a:p>
           <a:p>
             <a:endParaRPr lang="en-US" dirty="0"/>
@@ -851,7 +850,6 @@
               <a:rPr lang="en-US" dirty="0" smtClean="0"/>
               <a:t>Nick</a:t>
             </a:r>
-            <a:endParaRPr lang="en-US" dirty="0" smtClean="0"/>
           </a:p>
           <a:p>
             <a:endParaRPr lang="en-US" dirty="0"/>
@@ -957,7 +955,6 @@
               <a:rPr lang="en-US" dirty="0" smtClean="0"/>
               <a:t>Nick</a:t>
             </a:r>
-            <a:endParaRPr lang="en-US" dirty="0" smtClean="0"/>
           </a:p>
         </p:txBody>
       </p:sp>
@@ -2069,6 +2066,49 @@
               <a:rPr lang="en-US" dirty="0" smtClean="0"/>
               <a:t>Mike</a:t>
             </a:r>
+          </a:p>
+          <a:p>
+            <a:endParaRPr lang="en-US" dirty="0" smtClean="0"/>
+          </a:p>
+          <a:p>
+            <a:r>
+              <a:rPr lang="en-US" dirty="0" smtClean="0"/>
+              <a:t>-- describe glasses</a:t>
+            </a:r>
+            <a:r>
+              <a:rPr lang="en-US" baseline="0" dirty="0" smtClean="0"/>
+              <a:t> + camera</a:t>
+            </a:r>
+          </a:p>
+          <a:p>
+            <a:r>
+              <a:rPr lang="en-US" baseline="0" dirty="0" smtClean="0"/>
+              <a:t>-- talk about camera board + XBEE</a:t>
+            </a:r>
+          </a:p>
+          <a:p>
+            <a:r>
+              <a:rPr lang="en-US" baseline="0" dirty="0" smtClean="0"/>
+              <a:t>-- follow data through ARM, talk about DSP here.</a:t>
+            </a:r>
+          </a:p>
+          <a:p>
+            <a:r>
+              <a:rPr lang="en-US" baseline="0" dirty="0" smtClean="0"/>
+              <a:t>-- Mention data storage for debugging help</a:t>
+            </a:r>
+          </a:p>
+          <a:p>
+            <a:r>
+              <a:rPr lang="en-US" baseline="0" dirty="0" smtClean="0"/>
+              <a:t>-- Interface to computer</a:t>
+            </a:r>
+          </a:p>
+          <a:p>
+            <a:r>
+              <a:rPr lang="en-US" baseline="0" dirty="0" smtClean="0"/>
+              <a:t>	-- program on host computer to intercept control signals and control the cursor</a:t>
+            </a:r>
             <a:endParaRPr lang="en-US" dirty="0"/>
           </a:p>
         </p:txBody>
@@ -2155,6 +2195,18 @@
               <a:rPr lang="en-US" dirty="0" smtClean="0"/>
               <a:t>Mike</a:t>
             </a:r>
+          </a:p>
+          <a:p>
+            <a:r>
+              <a:rPr lang="en-US" dirty="0" smtClean="0"/>
+              <a:t>-- Our DSP will need some sort</a:t>
+            </a:r>
+            <a:r>
+              <a:rPr lang="en-US" baseline="0" dirty="0" smtClean="0"/>
+              <a:t> of floating point or fixed point (integer calculations not sufficient)</a:t>
+            </a:r>
+          </a:p>
+          <a:p>
             <a:endParaRPr lang="en-US" dirty="0"/>
           </a:p>
         </p:txBody>
@@ -2241,7 +2293,43 @@
               <a:rPr lang="en-US" dirty="0" smtClean="0"/>
               <a:t>Mike</a:t>
             </a:r>
-            <a:endParaRPr lang="en-US" dirty="0"/>
+          </a:p>
+          <a:p>
+            <a:r>
+              <a:rPr lang="en-US" dirty="0" smtClean="0"/>
+              <a:t>-</a:t>
+            </a:r>
+            <a:r>
+              <a:rPr lang="en-US" baseline="0" dirty="0" smtClean="0"/>
+              <a:t>- DSP chip that rapid fire used had a clock of 300MHz</a:t>
+            </a:r>
+          </a:p>
+          <a:p>
+            <a:r>
+              <a:rPr lang="en-US" baseline="0" dirty="0" smtClean="0"/>
+              <a:t>	-- only for high speed memory (data storage)</a:t>
+            </a:r>
+          </a:p>
+          <a:p>
+            <a:r>
+              <a:rPr lang="en-US" baseline="0" dirty="0" smtClean="0"/>
+              <a:t>-- fewer components in that we will have only the ARM, instead of a </a:t>
+            </a:r>
+            <a:r>
+              <a:rPr lang="en-US" baseline="0" dirty="0" err="1" smtClean="0"/>
+              <a:t>microcontoller</a:t>
+            </a:r>
+            <a:r>
+              <a:rPr lang="en-US" baseline="0" dirty="0" smtClean="0"/>
+              <a:t> + DSP chip.</a:t>
+            </a:r>
+          </a:p>
+          <a:p>
+            <a:r>
+              <a:rPr lang="en-US" baseline="0" dirty="0" smtClean="0"/>
+              <a:t>	-- does not include supporting components</a:t>
+            </a:r>
+            <a:endParaRPr lang="en-US" dirty="0" smtClean="0"/>
           </a:p>
         </p:txBody>
       </p:sp>
@@ -2327,6 +2415,22 @@
               <a:rPr lang="en-US" dirty="0" smtClean="0"/>
               <a:t>Mike</a:t>
             </a:r>
+          </a:p>
+          <a:p>
+            <a:r>
+              <a:rPr lang="en-US" dirty="0" smtClean="0"/>
+              <a:t>-- uses</a:t>
+            </a:r>
+            <a:r>
+              <a:rPr lang="en-US" baseline="0" dirty="0" smtClean="0"/>
+              <a:t> cortex A8 processor</a:t>
+            </a:r>
+          </a:p>
+          <a:p>
+            <a:r>
+              <a:rPr lang="en-US" baseline="0" dirty="0" smtClean="0"/>
+              <a:t>	-- speed of 600MHz</a:t>
+            </a:r>
             <a:endParaRPr lang="en-US" dirty="0"/>
           </a:p>
         </p:txBody>
@@ -2413,7 +2517,22 @@
               <a:rPr lang="en-US" dirty="0" smtClean="0"/>
               <a:t>Mike</a:t>
             </a:r>
-            <a:endParaRPr lang="en-US" dirty="0"/>
+          </a:p>
+          <a:p>
+            <a:r>
+              <a:rPr lang="en-US" dirty="0" smtClean="0"/>
+              <a:t>--</a:t>
+            </a:r>
+            <a:r>
+              <a:rPr lang="en-US" baseline="0" dirty="0" smtClean="0"/>
+              <a:t> cortex M4 ~180 MHz</a:t>
+            </a:r>
+          </a:p>
+          <a:p>
+            <a:r>
+              <a:rPr lang="en-US" baseline="0" dirty="0" smtClean="0"/>
+              <a:t>-- cortex R4 ~200 MHz</a:t>
+            </a:r>
           </a:p>
         </p:txBody>
       </p:sp>
@@ -2671,7 +2790,67 @@
               <a:rPr lang="en-US" dirty="0" smtClean="0"/>
               <a:t>Arielle</a:t>
             </a:r>
-            <a:endParaRPr lang="en-US" dirty="0"/>
+          </a:p>
+          <a:p>
+            <a:r>
+              <a:rPr lang="en-US" dirty="0" smtClean="0"/>
+              <a:t>-- from </a:t>
+            </a:r>
+            <a:r>
+              <a:rPr lang="en-US" dirty="0" err="1" smtClean="0"/>
+              <a:t>SparkFun</a:t>
+            </a:r>
+            <a:endParaRPr lang="en-US" dirty="0" smtClean="0"/>
+          </a:p>
+          <a:p>
+            <a:r>
+              <a:rPr lang="en-US" dirty="0" smtClean="0"/>
+              <a:t>--</a:t>
+            </a:r>
+            <a:r>
+              <a:rPr lang="en-US" baseline="0" dirty="0" smtClean="0"/>
+              <a:t> two points of interest</a:t>
+            </a:r>
+          </a:p>
+          <a:p>
+            <a:r>
+              <a:rPr lang="en-US" baseline="0" dirty="0" smtClean="0"/>
+              <a:t>	-- range = plenty enough</a:t>
+            </a:r>
+          </a:p>
+          <a:p>
+            <a:r>
+              <a:rPr lang="en-US" baseline="0" dirty="0" smtClean="0"/>
+              <a:t>	-- speed -&gt; based on calculation of </a:t>
+            </a:r>
+            <a:r>
+              <a:rPr lang="en-US" baseline="0" dirty="0" err="1" smtClean="0"/>
+              <a:t>maximun</a:t>
+            </a:r>
+            <a:r>
+              <a:rPr lang="en-US" baseline="0" dirty="0" smtClean="0"/>
+              <a:t> data output from camera</a:t>
+            </a:r>
+          </a:p>
+          <a:p>
+            <a:r>
+              <a:rPr lang="en-US" baseline="0" dirty="0" smtClean="0"/>
+              <a:t>		we do not exceed 250 kbps so the XBEE will be able</a:t>
+            </a:r>
+            <a:r>
+              <a:rPr lang="en-US" baseline="0" dirty="0"/>
+              <a:t> </a:t>
+            </a:r>
+            <a:r>
+              <a:rPr lang="en-US" baseline="0" dirty="0" smtClean="0"/>
+              <a:t>to</a:t>
+            </a:r>
+          </a:p>
+          <a:p>
+            <a:r>
+              <a:rPr lang="en-US" baseline="0" dirty="0" smtClean="0"/>
+              <a:t>		transmit all of the images with no slowing</a:t>
+            </a:r>
           </a:p>
         </p:txBody>
       </p:sp>
@@ -2755,7 +2934,7 @@
           <a:p>
             <a:r>
               <a:rPr lang="en-US" dirty="0" smtClean="0"/>
-              <a:t>Arielle</a:t>
+              <a:t>Mike</a:t>
             </a:r>
             <a:endParaRPr lang="en-US" dirty="0"/>
           </a:p>
@@ -2841,7 +3020,29 @@
           <a:p>
             <a:r>
               <a:rPr lang="en-US" dirty="0" smtClean="0"/>
-              <a:t>Arielle</a:t>
+              <a:t>Mike</a:t>
+            </a:r>
+          </a:p>
+          <a:p>
+            <a:r>
+              <a:rPr lang="en-US" dirty="0" smtClean="0"/>
+              <a:t>-- like mentioned</a:t>
+            </a:r>
+            <a:r>
+              <a:rPr lang="en-US" baseline="0" dirty="0" smtClean="0"/>
+              <a:t> before based on the quick calculation we did we should have sufficient bandwidth to</a:t>
+            </a:r>
+          </a:p>
+          <a:p>
+            <a:r>
+              <a:rPr lang="en-US" baseline="0" dirty="0" smtClean="0"/>
+              <a:t>   transmit all of the images</a:t>
+            </a:r>
+          </a:p>
+          <a:p>
+            <a:r>
+              <a:rPr lang="en-US" baseline="0" dirty="0" smtClean="0"/>
+              <a:t>-- low power, consider cell phones which have power ratings around 1 Watt</a:t>
             </a:r>
             <a:endParaRPr lang="en-US" dirty="0"/>
           </a:p>
@@ -3290,7 +3491,6 @@
               <a:rPr lang="en-US" dirty="0" smtClean="0"/>
               <a:t>Arielle</a:t>
             </a:r>
-            <a:endParaRPr lang="en-US" dirty="0" smtClean="0"/>
           </a:p>
           <a:p>
             <a:endParaRPr lang="en-US" dirty="0"/>
@@ -3396,7 +3596,6 @@
               <a:rPr lang="en-US" dirty="0" smtClean="0"/>
               <a:t>Arielle</a:t>
             </a:r>
-            <a:endParaRPr lang="en-US" dirty="0" smtClean="0"/>
           </a:p>
           <a:p>
             <a:endParaRPr lang="en-US" dirty="0"/>
@@ -3609,11 +3808,7 @@
             </a:r>
             <a:r>
               <a:rPr lang="en-US" baseline="0" dirty="0" smtClean="0"/>
-              <a:t> from the retina is directed away from the camera</a:t>
-            </a:r>
-            <a:r>
-              <a:rPr lang="en-US" baseline="0" dirty="0" smtClean="0"/>
-              <a:t>.</a:t>
+              <a:t> from the retina is directed away from the camera.</a:t>
             </a:r>
           </a:p>
           <a:p>
@@ -3936,7 +4131,6 @@
               <a:rPr lang="en-US" dirty="0" smtClean="0"/>
               <a:t>Nick</a:t>
             </a:r>
-            <a:endParaRPr lang="en-US" dirty="0" smtClean="0"/>
           </a:p>
           <a:p>
             <a:endParaRPr lang="en-US" dirty="0"/>
@@ -4040,7 +4234,6 @@
               <a:rPr lang="en-US" dirty="0" smtClean="0"/>
               <a:t>Nick</a:t>
             </a:r>
-            <a:endParaRPr lang="en-US" dirty="0" smtClean="0"/>
           </a:p>
           <a:p>
             <a:endParaRPr lang="en-US" dirty="0"/>
@@ -4151,7 +4344,6 @@
               <a:rPr lang="en-US" dirty="0" smtClean="0"/>
               <a:t>Nick</a:t>
             </a:r>
-            <a:endParaRPr lang="en-US" dirty="0" smtClean="0"/>
           </a:p>
           <a:p>
             <a:endParaRPr lang="en-US" dirty="0"/>
@@ -4410,7 +4602,7 @@
             <a:fld id="{F30248B0-18BD-4641-9AF0-CE01AB548F85}" type="datetimeFigureOut">
               <a:rPr lang="en-US" smtClean="0"/>
               <a:pPr/>
-              <a:t>1/29/2012</a:t>
+              <a:t>1/30/2012</a:t>
             </a:fld>
             <a:endParaRPr lang="en-US"/>
           </a:p>
@@ -4599,7 +4791,7 @@
             <a:fld id="{F30248B0-18BD-4641-9AF0-CE01AB548F85}" type="datetimeFigureOut">
               <a:rPr lang="en-US" smtClean="0"/>
               <a:pPr/>
-              <a:t>1/29/2012</a:t>
+              <a:t>1/30/2012</a:t>
             </a:fld>
             <a:endParaRPr lang="en-US"/>
           </a:p>
@@ -4776,7 +4968,7 @@
             <a:fld id="{F30248B0-18BD-4641-9AF0-CE01AB548F85}" type="datetimeFigureOut">
               <a:rPr lang="en-US" smtClean="0"/>
               <a:pPr/>
-              <a:t>1/29/2012</a:t>
+              <a:t>1/30/2012</a:t>
             </a:fld>
             <a:endParaRPr lang="en-US"/>
           </a:p>
@@ -4958,7 +5150,7 @@
             <a:fld id="{F30248B0-18BD-4641-9AF0-CE01AB548F85}" type="datetimeFigureOut">
               <a:rPr lang="en-US" smtClean="0"/>
               <a:pPr/>
-              <a:t>1/29/2012</a:t>
+              <a:t>1/30/2012</a:t>
             </a:fld>
             <a:endParaRPr lang="en-US"/>
           </a:p>
@@ -5202,7 +5394,7 @@
             <a:fld id="{F30248B0-18BD-4641-9AF0-CE01AB548F85}" type="datetimeFigureOut">
               <a:rPr lang="en-US" smtClean="0"/>
               <a:pPr/>
-              <a:t>1/29/2012</a:t>
+              <a:t>1/30/2012</a:t>
             </a:fld>
             <a:endParaRPr lang="en-US"/>
           </a:p>
@@ -5678,7 +5870,7 @@
             <a:fld id="{F30248B0-18BD-4641-9AF0-CE01AB548F85}" type="datetimeFigureOut">
               <a:rPr lang="en-US" smtClean="0"/>
               <a:pPr/>
-              <a:t>1/29/2012</a:t>
+              <a:t>1/30/2012</a:t>
             </a:fld>
             <a:endParaRPr lang="en-US"/>
           </a:p>
@@ -6090,7 +6282,7 @@
             <a:fld id="{F30248B0-18BD-4641-9AF0-CE01AB548F85}" type="datetimeFigureOut">
               <a:rPr lang="en-US" smtClean="0"/>
               <a:pPr/>
-              <a:t>1/29/2012</a:t>
+              <a:t>1/30/2012</a:t>
             </a:fld>
             <a:endParaRPr lang="en-US"/>
           </a:p>
@@ -6223,7 +6415,7 @@
             <a:fld id="{F30248B0-18BD-4641-9AF0-CE01AB548F85}" type="datetimeFigureOut">
               <a:rPr lang="en-US" smtClean="0"/>
               <a:pPr/>
-              <a:t>1/29/2012</a:t>
+              <a:t>1/30/2012</a:t>
             </a:fld>
             <a:endParaRPr lang="en-US"/>
           </a:p>
@@ -6320,7 +6512,7 @@
             <a:fld id="{F30248B0-18BD-4641-9AF0-CE01AB548F85}" type="datetimeFigureOut">
               <a:rPr lang="en-US" smtClean="0"/>
               <a:pPr/>
-              <a:t>1/29/2012</a:t>
+              <a:t>1/30/2012</a:t>
             </a:fld>
             <a:endParaRPr lang="en-US"/>
           </a:p>
@@ -6595,7 +6787,7 @@
             <a:fld id="{F30248B0-18BD-4641-9AF0-CE01AB548F85}" type="datetimeFigureOut">
               <a:rPr lang="en-US" smtClean="0"/>
               <a:pPr/>
-              <a:t>1/29/2012</a:t>
+              <a:t>1/30/2012</a:t>
             </a:fld>
             <a:endParaRPr lang="en-US"/>
           </a:p>
@@ -6844,7 +7036,7 @@
             <a:fld id="{F30248B0-18BD-4641-9AF0-CE01AB548F85}" type="datetimeFigureOut">
               <a:rPr lang="en-US" smtClean="0"/>
               <a:pPr/>
-              <a:t>1/29/2012</a:t>
+              <a:t>1/30/2012</a:t>
             </a:fld>
             <a:endParaRPr lang="en-US"/>
           </a:p>
@@ -7242,7 +7434,7 @@
             <a:fld id="{F30248B0-18BD-4641-9AF0-CE01AB548F85}" type="datetimeFigureOut">
               <a:rPr lang="en-US" smtClean="0"/>
               <a:pPr/>
-              <a:t>1/29/2012</a:t>
+              <a:t>1/30/2012</a:t>
             </a:fld>
             <a:endParaRPr lang="en-US"/>
           </a:p>
@@ -11467,13 +11659,8 @@
             <a:pPr lvl="1"/>
             <a:r>
               <a:rPr lang="en-US" dirty="0" smtClean="0"/>
-              <a:t>Finding a high speed arm that is not a </a:t>
-            </a:r>
-            <a:r>
-              <a:rPr lang="en-US" dirty="0" smtClean="0"/>
-              <a:t>BGA</a:t>
-            </a:r>
-            <a:endParaRPr lang="en-US" dirty="0" smtClean="0"/>
+              <a:t>Finding a high speed arm that is not a BGA</a:t>
+            </a:r>
           </a:p>
           <a:p>
             <a:endParaRPr lang="en-US" dirty="0" smtClean="0"/>
@@ -12112,22 +12299,14 @@
           <a:p>
             <a:r>
               <a:rPr lang="en-US" dirty="0" smtClean="0"/>
-              <a:t>RF </a:t>
-            </a:r>
+              <a:t>RF Exposure (Time and Distance)</a:t>
+            </a:r>
+          </a:p>
+          <a:p>
+            <a:pPr lvl="1"/>
             <a:r>
               <a:rPr lang="en-US" dirty="0" smtClean="0"/>
-              <a:t>Exposure (Time and Distance)</a:t>
-            </a:r>
-          </a:p>
-          <a:p>
-            <a:pPr lvl="1"/>
-            <a:r>
-              <a:rPr lang="en-US" dirty="0" smtClean="0"/>
-              <a:t>1mW </a:t>
-            </a:r>
-            <a:r>
-              <a:rPr lang="en-US" dirty="0" smtClean="0"/>
-              <a:t>Wireless</a:t>
+              <a:t>1mW Wireless</a:t>
             </a:r>
             <a:endParaRPr lang="en-US" dirty="0"/>
           </a:p>
@@ -12624,15 +12803,7 @@
           <a:p>
             <a:r>
               <a:rPr lang="en-US" dirty="0" smtClean="0"/>
-              <a:t>Controlled across </a:t>
-            </a:r>
-            <a:r>
-              <a:rPr lang="en-US" dirty="0" smtClean="0"/>
-              <a:t>I2C </a:t>
-            </a:r>
-            <a:r>
-              <a:rPr lang="en-US" dirty="0" smtClean="0"/>
-              <a:t>(</a:t>
+              <a:t>Controlled across I2C (</a:t>
             </a:r>
             <a:r>
               <a:rPr lang="en-US" dirty="0" err="1" smtClean="0"/>

</xml_diff>